<commit_message>
update notenotebooks and slides
</commit_message>
<xml_diff>
--- a/slides/01 Introduction to NLP.pptx
+++ b/slides/01 Introduction to NLP.pptx
@@ -44,82 +44,84 @@
     <p:sldId id="392" r:id="rId37"/>
     <p:sldId id="393" r:id="rId38"/>
     <p:sldId id="281" r:id="rId39"/>
-    <p:sldId id="282" r:id="rId40"/>
-    <p:sldId id="283" r:id="rId41"/>
-    <p:sldId id="284" r:id="rId42"/>
-    <p:sldId id="285" r:id="rId43"/>
-    <p:sldId id="286" r:id="rId44"/>
-    <p:sldId id="287" r:id="rId45"/>
-    <p:sldId id="288" r:id="rId46"/>
-    <p:sldId id="289" r:id="rId47"/>
-    <p:sldId id="290" r:id="rId48"/>
-    <p:sldId id="291" r:id="rId49"/>
-    <p:sldId id="292" r:id="rId50"/>
-    <p:sldId id="293" r:id="rId51"/>
-    <p:sldId id="395" r:id="rId52"/>
-    <p:sldId id="394" r:id="rId53"/>
-    <p:sldId id="294" r:id="rId54"/>
-    <p:sldId id="295" r:id="rId55"/>
-    <p:sldId id="296" r:id="rId56"/>
-    <p:sldId id="297" r:id="rId57"/>
-    <p:sldId id="298" r:id="rId58"/>
-    <p:sldId id="299" r:id="rId59"/>
-    <p:sldId id="300" r:id="rId60"/>
-    <p:sldId id="301" r:id="rId61"/>
-    <p:sldId id="302" r:id="rId62"/>
-    <p:sldId id="303" r:id="rId63"/>
-    <p:sldId id="304" r:id="rId64"/>
-    <p:sldId id="305" r:id="rId65"/>
-    <p:sldId id="306" r:id="rId66"/>
-    <p:sldId id="307" r:id="rId67"/>
-    <p:sldId id="308" r:id="rId68"/>
-    <p:sldId id="309" r:id="rId69"/>
-    <p:sldId id="310" r:id="rId70"/>
-    <p:sldId id="317" r:id="rId71"/>
-    <p:sldId id="318" r:id="rId72"/>
+    <p:sldId id="283" r:id="rId40"/>
+    <p:sldId id="284" r:id="rId41"/>
+    <p:sldId id="449" r:id="rId42"/>
+    <p:sldId id="450" r:id="rId43"/>
+    <p:sldId id="282" r:id="rId44"/>
+    <p:sldId id="285" r:id="rId45"/>
+    <p:sldId id="286" r:id="rId46"/>
+    <p:sldId id="287" r:id="rId47"/>
+    <p:sldId id="288" r:id="rId48"/>
+    <p:sldId id="289" r:id="rId49"/>
+    <p:sldId id="290" r:id="rId50"/>
+    <p:sldId id="291" r:id="rId51"/>
+    <p:sldId id="292" r:id="rId52"/>
+    <p:sldId id="293" r:id="rId53"/>
+    <p:sldId id="395" r:id="rId54"/>
+    <p:sldId id="394" r:id="rId55"/>
+    <p:sldId id="294" r:id="rId56"/>
+    <p:sldId id="295" r:id="rId57"/>
+    <p:sldId id="296" r:id="rId58"/>
+    <p:sldId id="297" r:id="rId59"/>
+    <p:sldId id="298" r:id="rId60"/>
+    <p:sldId id="299" r:id="rId61"/>
+    <p:sldId id="300" r:id="rId62"/>
+    <p:sldId id="301" r:id="rId63"/>
+    <p:sldId id="302" r:id="rId64"/>
+    <p:sldId id="303" r:id="rId65"/>
+    <p:sldId id="304" r:id="rId66"/>
+    <p:sldId id="305" r:id="rId67"/>
+    <p:sldId id="306" r:id="rId68"/>
+    <p:sldId id="307" r:id="rId69"/>
+    <p:sldId id="308" r:id="rId70"/>
+    <p:sldId id="309" r:id="rId71"/>
+    <p:sldId id="310" r:id="rId72"/>
+    <p:sldId id="317" r:id="rId73"/>
+    <p:sldId id="318" r:id="rId74"/>
   </p:sldIdLst>
   <p:sldSz cx="9144000" cy="5143500"/>
   <p:notesSz cx="6858000" cy="9144000"/>
   <p:embeddedFontLst>
     <p:embeddedFont>
       <p:font typeface="Calibri" panose="020F0502020204030204"/>
-      <p:regular r:id="rId76"/>
+      <p:regular r:id="rId78"/>
     </p:embeddedFont>
     <p:embeddedFont>
       <p:font typeface="Roboto" panose="02000000000000000000"/>
-      <p:regular r:id="rId77"/>
-      <p:bold r:id="rId78"/>
-      <p:italic r:id="rId79"/>
-      <p:boldItalic r:id="rId80"/>
+      <p:regular r:id="rId79"/>
+      <p:bold r:id="rId80"/>
+      <p:italic r:id="rId81"/>
+      <p:boldItalic r:id="rId82"/>
+    </p:embeddedFont>
+    <p:embeddedFont>
+      <p:font typeface="Calibri" panose="020F0502020204030204" charset="0"/>
+      <p:regular r:id="rId83"/>
+      <p:bold r:id="rId84"/>
+      <p:italic r:id="rId85"/>
+      <p:boldItalic r:id="rId86"/>
+    </p:embeddedFont>
+    <p:embeddedFont>
+      <p:font typeface="MS PGothic" panose="020B0600070205080204" charset="-128"/>
+      <p:regular r:id="rId87"/>
+    </p:embeddedFont>
+    <p:embeddedFont>
+      <p:font typeface="Lucida Sans" panose="020B0602030504020204" charset="0"/>
+      <p:regular r:id="rId88"/>
+      <p:bold r:id="rId89"/>
+      <p:italic r:id="rId90"/>
     </p:embeddedFont>
     <p:embeddedFont>
       <p:font typeface="Roboto Mono" panose="00000009000000000000"/>
-      <p:regular r:id="rId81"/>
-      <p:bold r:id="rId82"/>
-      <p:italic r:id="rId83"/>
-      <p:boldItalic r:id="rId84"/>
+      <p:regular r:id="rId91"/>
+      <p:bold r:id="rId92"/>
+      <p:italic r:id="rId93"/>
+      <p:boldItalic r:id="rId94"/>
     </p:embeddedFont>
     <p:embeddedFont>
       <p:font typeface="Noto Sans Symbols"/>
-      <p:regular r:id="rId85"/>
-      <p:bold r:id="rId86"/>
-    </p:embeddedFont>
-    <p:embeddedFont>
-      <p:font typeface="Calibri" panose="020F0502020204030204" charset="0"/>
-      <p:regular r:id="rId87"/>
-      <p:bold r:id="rId88"/>
-      <p:italic r:id="rId89"/>
-      <p:boldItalic r:id="rId90"/>
-    </p:embeddedFont>
-    <p:embeddedFont>
-      <p:font typeface="MS PGothic" panose="020B0600070205080204" charset="-128"/>
-      <p:regular r:id="rId91"/>
-    </p:embeddedFont>
-    <p:embeddedFont>
-      <p:font typeface="Lucida Sans" panose="020B0602030504020204" charset="0"/>
-      <p:regular r:id="rId92"/>
-      <p:bold r:id="rId93"/>
-      <p:italic r:id="rId94"/>
+      <p:regular r:id="rId95"/>
+      <p:bold r:id="rId96"/>
     </p:embeddedFont>
   </p:embeddedFontLst>
   <p:defaultTextStyle>
@@ -354,7 +356,7 @@
   <p:extLst>
     <p:ext uri="{EFAFB233-063F-42B5-8137-9DF3F51BA10A}">
       <p15:sldGuideLst xmlns:p15="http://schemas.microsoft.com/office/powerpoint/2012/main">
-        <p15:guide id="1" orient="horz" pos="1612" userDrawn="1">
+        <p15:guide id="1" orient="horz" pos="1620" userDrawn="1">
           <p15:clr>
             <a:srgbClr val="747775"/>
           </p15:clr>
@@ -4036,6 +4038,204 @@
   <p:cSld>
     <p:spTree>
       <p:nvGrpSpPr>
+        <p:cNvPr id="329" name="Shape 329"/>
+        <p:cNvGrpSpPr/>
+        <p:nvPr/>
+      </p:nvGrpSpPr>
+      <p:grpSpPr>
+        <a:xfrm>
+          <a:off x="0" y="0"/>
+          <a:ext cx="0" cy="0"/>
+          <a:chOff x="0" y="0"/>
+          <a:chExt cx="0" cy="0"/>
+        </a:xfrm>
+      </p:grpSpPr>
+      <p:sp>
+        <p:nvSpPr>
+          <p:cNvPr id="330" name="Google Shape;330;g30ad953b3ee_0_35:notes"/>
+          <p:cNvSpPr/>
+          <p:nvPr>
+            <p:ph type="sldImg" idx="2"/>
+          </p:nvPr>
+        </p:nvSpPr>
+        <p:spPr>
+          <a:xfrm>
+            <a:off x="381300" y="685800"/>
+            <a:ext cx="6096000" cy="3429000"/>
+          </a:xfrm>
+          <a:custGeom>
+            <a:avLst/>
+            <a:gdLst/>
+            <a:ahLst/>
+            <a:cxnLst/>
+            <a:rect l="l" t="t" r="r" b="b"/>
+            <a:pathLst>
+              <a:path w="120000" h="120000" extrusionOk="0">
+                <a:moveTo>
+                  <a:pt x="0" y="0"/>
+                </a:moveTo>
+                <a:lnTo>
+                  <a:pt x="120000" y="0"/>
+                </a:lnTo>
+                <a:lnTo>
+                  <a:pt x="120000" y="120000"/>
+                </a:lnTo>
+                <a:lnTo>
+                  <a:pt x="0" y="120000"/>
+                </a:lnTo>
+                <a:close/>
+              </a:path>
+            </a:pathLst>
+          </a:custGeom>
+        </p:spPr>
+      </p:sp>
+      <p:sp>
+        <p:nvSpPr>
+          <p:cNvPr id="331" name="Google Shape;331;g30ad953b3ee_0_35:notes"/>
+          <p:cNvSpPr txBox="1"/>
+          <p:nvPr>
+            <p:ph type="body" idx="1"/>
+          </p:nvPr>
+        </p:nvSpPr>
+        <p:spPr>
+          <a:xfrm>
+            <a:off x="685800" y="4343400"/>
+            <a:ext cx="5486400" cy="4114800"/>
+          </a:xfrm>
+          <a:prstGeom prst="rect">
+            <a:avLst/>
+          </a:prstGeom>
+        </p:spPr>
+        <p:txBody>
+          <a:bodyPr spcFirstLastPara="1" wrap="square" lIns="91425" tIns="91425" rIns="91425" bIns="91425" anchor="t" anchorCtr="0">
+            <a:noAutofit/>
+          </a:bodyPr>
+          <a:lstStyle/>
+          <a:p>
+            <a:pPr marL="0" lvl="0" indent="0" algn="l" rtl="0">
+              <a:spcBef>
+                <a:spcPts val="0"/>
+              </a:spcBef>
+              <a:spcAft>
+                <a:spcPts val="0"/>
+              </a:spcAft>
+              <a:buNone/>
+            </a:pPr>
+          </a:p>
+        </p:txBody>
+      </p:sp>
+    </p:spTree>
+  </p:cSld>
+  <p:clrMapOvr>
+    <a:masterClrMapping/>
+  </p:clrMapOvr>
+</p:notes>
+</file>
+
+<file path=ppt/notesSlides/notesSlide34.xml><?xml version="1.0" encoding="utf-8"?>
+<p:notes xmlns:a="http://schemas.openxmlformats.org/drawingml/2006/main" xmlns:r="http://schemas.openxmlformats.org/officeDocument/2006/relationships" xmlns:p="http://schemas.openxmlformats.org/presentationml/2006/main" showMasterPhAnim="0" showMasterSp="0">
+  <p:cSld>
+    <p:spTree>
+      <p:nvGrpSpPr>
+        <p:cNvPr id="335" name="Shape 335"/>
+        <p:cNvGrpSpPr/>
+        <p:nvPr/>
+      </p:nvGrpSpPr>
+      <p:grpSpPr>
+        <a:xfrm>
+          <a:off x="0" y="0"/>
+          <a:ext cx="0" cy="0"/>
+          <a:chOff x="0" y="0"/>
+          <a:chExt cx="0" cy="0"/>
+        </a:xfrm>
+      </p:grpSpPr>
+      <p:sp>
+        <p:nvSpPr>
+          <p:cNvPr id="336" name="Google Shape;336;g30ad953b3ee_0_23:notes"/>
+          <p:cNvSpPr/>
+          <p:nvPr>
+            <p:ph type="sldImg" idx="2"/>
+          </p:nvPr>
+        </p:nvSpPr>
+        <p:spPr>
+          <a:xfrm>
+            <a:off x="381300" y="685800"/>
+            <a:ext cx="6096000" cy="3429000"/>
+          </a:xfrm>
+          <a:custGeom>
+            <a:avLst/>
+            <a:gdLst/>
+            <a:ahLst/>
+            <a:cxnLst/>
+            <a:rect l="l" t="t" r="r" b="b"/>
+            <a:pathLst>
+              <a:path w="120000" h="120000" extrusionOk="0">
+                <a:moveTo>
+                  <a:pt x="0" y="0"/>
+                </a:moveTo>
+                <a:lnTo>
+                  <a:pt x="120000" y="0"/>
+                </a:lnTo>
+                <a:lnTo>
+                  <a:pt x="120000" y="120000"/>
+                </a:lnTo>
+                <a:lnTo>
+                  <a:pt x="0" y="120000"/>
+                </a:lnTo>
+                <a:close/>
+              </a:path>
+            </a:pathLst>
+          </a:custGeom>
+        </p:spPr>
+      </p:sp>
+      <p:sp>
+        <p:nvSpPr>
+          <p:cNvPr id="337" name="Google Shape;337;g30ad953b3ee_0_23:notes"/>
+          <p:cNvSpPr txBox="1"/>
+          <p:nvPr>
+            <p:ph type="body" idx="1"/>
+          </p:nvPr>
+        </p:nvSpPr>
+        <p:spPr>
+          <a:xfrm>
+            <a:off x="685800" y="4343400"/>
+            <a:ext cx="5486400" cy="4114800"/>
+          </a:xfrm>
+          <a:prstGeom prst="rect">
+            <a:avLst/>
+          </a:prstGeom>
+        </p:spPr>
+        <p:txBody>
+          <a:bodyPr spcFirstLastPara="1" wrap="square" lIns="91425" tIns="91425" rIns="91425" bIns="91425" anchor="t" anchorCtr="0">
+            <a:noAutofit/>
+          </a:bodyPr>
+          <a:lstStyle/>
+          <a:p>
+            <a:pPr marL="0" lvl="0" indent="0" algn="l" rtl="0">
+              <a:spcBef>
+                <a:spcPts val="0"/>
+              </a:spcBef>
+              <a:spcAft>
+                <a:spcPts val="0"/>
+              </a:spcAft>
+              <a:buNone/>
+            </a:pPr>
+          </a:p>
+        </p:txBody>
+      </p:sp>
+    </p:spTree>
+  </p:cSld>
+  <p:clrMapOvr>
+    <a:masterClrMapping/>
+  </p:clrMapOvr>
+</p:notes>
+</file>
+
+<file path=ppt/notesSlides/notesSlide35.xml><?xml version="1.0" encoding="utf-8"?>
+<p:notes xmlns:a="http://schemas.openxmlformats.org/drawingml/2006/main" xmlns:r="http://schemas.openxmlformats.org/officeDocument/2006/relationships" xmlns:p="http://schemas.openxmlformats.org/presentationml/2006/main" showMasterPhAnim="0" showMasterSp="0">
+  <p:cSld>
+    <p:spTree>
+      <p:nvGrpSpPr>
         <p:cNvPr id="322" name="Shape 322"/>
         <p:cNvGrpSpPr/>
         <p:nvPr/>
@@ -4199,204 +4399,6 @@
               <a:cs typeface="Arial" panose="020B0604020202020204"/>
               <a:sym typeface="Arial" panose="020B0604020202020204"/>
             </a:endParaRPr>
-          </a:p>
-        </p:txBody>
-      </p:sp>
-    </p:spTree>
-  </p:cSld>
-  <p:clrMapOvr>
-    <a:masterClrMapping/>
-  </p:clrMapOvr>
-</p:notes>
-</file>
-
-<file path=ppt/notesSlides/notesSlide34.xml><?xml version="1.0" encoding="utf-8"?>
-<p:notes xmlns:a="http://schemas.openxmlformats.org/drawingml/2006/main" xmlns:r="http://schemas.openxmlformats.org/officeDocument/2006/relationships" xmlns:p="http://schemas.openxmlformats.org/presentationml/2006/main" showMasterPhAnim="0" showMasterSp="0">
-  <p:cSld>
-    <p:spTree>
-      <p:nvGrpSpPr>
-        <p:cNvPr id="329" name="Shape 329"/>
-        <p:cNvGrpSpPr/>
-        <p:nvPr/>
-      </p:nvGrpSpPr>
-      <p:grpSpPr>
-        <a:xfrm>
-          <a:off x="0" y="0"/>
-          <a:ext cx="0" cy="0"/>
-          <a:chOff x="0" y="0"/>
-          <a:chExt cx="0" cy="0"/>
-        </a:xfrm>
-      </p:grpSpPr>
-      <p:sp>
-        <p:nvSpPr>
-          <p:cNvPr id="330" name="Google Shape;330;g30ad953b3ee_0_35:notes"/>
-          <p:cNvSpPr/>
-          <p:nvPr>
-            <p:ph type="sldImg" idx="2"/>
-          </p:nvPr>
-        </p:nvSpPr>
-        <p:spPr>
-          <a:xfrm>
-            <a:off x="381300" y="685800"/>
-            <a:ext cx="6096000" cy="3429000"/>
-          </a:xfrm>
-          <a:custGeom>
-            <a:avLst/>
-            <a:gdLst/>
-            <a:ahLst/>
-            <a:cxnLst/>
-            <a:rect l="l" t="t" r="r" b="b"/>
-            <a:pathLst>
-              <a:path w="120000" h="120000" extrusionOk="0">
-                <a:moveTo>
-                  <a:pt x="0" y="0"/>
-                </a:moveTo>
-                <a:lnTo>
-                  <a:pt x="120000" y="0"/>
-                </a:lnTo>
-                <a:lnTo>
-                  <a:pt x="120000" y="120000"/>
-                </a:lnTo>
-                <a:lnTo>
-                  <a:pt x="0" y="120000"/>
-                </a:lnTo>
-                <a:close/>
-              </a:path>
-            </a:pathLst>
-          </a:custGeom>
-        </p:spPr>
-      </p:sp>
-      <p:sp>
-        <p:nvSpPr>
-          <p:cNvPr id="331" name="Google Shape;331;g30ad953b3ee_0_35:notes"/>
-          <p:cNvSpPr txBox="1"/>
-          <p:nvPr>
-            <p:ph type="body" idx="1"/>
-          </p:nvPr>
-        </p:nvSpPr>
-        <p:spPr>
-          <a:xfrm>
-            <a:off x="685800" y="4343400"/>
-            <a:ext cx="5486400" cy="4114800"/>
-          </a:xfrm>
-          <a:prstGeom prst="rect">
-            <a:avLst/>
-          </a:prstGeom>
-        </p:spPr>
-        <p:txBody>
-          <a:bodyPr spcFirstLastPara="1" wrap="square" lIns="91425" tIns="91425" rIns="91425" bIns="91425" anchor="t" anchorCtr="0">
-            <a:noAutofit/>
-          </a:bodyPr>
-          <a:lstStyle/>
-          <a:p>
-            <a:pPr marL="0" lvl="0" indent="0" algn="l" rtl="0">
-              <a:spcBef>
-                <a:spcPts val="0"/>
-              </a:spcBef>
-              <a:spcAft>
-                <a:spcPts val="0"/>
-              </a:spcAft>
-              <a:buNone/>
-            </a:pPr>
-          </a:p>
-        </p:txBody>
-      </p:sp>
-    </p:spTree>
-  </p:cSld>
-  <p:clrMapOvr>
-    <a:masterClrMapping/>
-  </p:clrMapOvr>
-</p:notes>
-</file>
-
-<file path=ppt/notesSlides/notesSlide35.xml><?xml version="1.0" encoding="utf-8"?>
-<p:notes xmlns:a="http://schemas.openxmlformats.org/drawingml/2006/main" xmlns:r="http://schemas.openxmlformats.org/officeDocument/2006/relationships" xmlns:p="http://schemas.openxmlformats.org/presentationml/2006/main" showMasterPhAnim="0" showMasterSp="0">
-  <p:cSld>
-    <p:spTree>
-      <p:nvGrpSpPr>
-        <p:cNvPr id="335" name="Shape 335"/>
-        <p:cNvGrpSpPr/>
-        <p:nvPr/>
-      </p:nvGrpSpPr>
-      <p:grpSpPr>
-        <a:xfrm>
-          <a:off x="0" y="0"/>
-          <a:ext cx="0" cy="0"/>
-          <a:chOff x="0" y="0"/>
-          <a:chExt cx="0" cy="0"/>
-        </a:xfrm>
-      </p:grpSpPr>
-      <p:sp>
-        <p:nvSpPr>
-          <p:cNvPr id="336" name="Google Shape;336;g30ad953b3ee_0_23:notes"/>
-          <p:cNvSpPr/>
-          <p:nvPr>
-            <p:ph type="sldImg" idx="2"/>
-          </p:nvPr>
-        </p:nvSpPr>
-        <p:spPr>
-          <a:xfrm>
-            <a:off x="381300" y="685800"/>
-            <a:ext cx="6096000" cy="3429000"/>
-          </a:xfrm>
-          <a:custGeom>
-            <a:avLst/>
-            <a:gdLst/>
-            <a:ahLst/>
-            <a:cxnLst/>
-            <a:rect l="l" t="t" r="r" b="b"/>
-            <a:pathLst>
-              <a:path w="120000" h="120000" extrusionOk="0">
-                <a:moveTo>
-                  <a:pt x="0" y="0"/>
-                </a:moveTo>
-                <a:lnTo>
-                  <a:pt x="120000" y="0"/>
-                </a:lnTo>
-                <a:lnTo>
-                  <a:pt x="120000" y="120000"/>
-                </a:lnTo>
-                <a:lnTo>
-                  <a:pt x="0" y="120000"/>
-                </a:lnTo>
-                <a:close/>
-              </a:path>
-            </a:pathLst>
-          </a:custGeom>
-        </p:spPr>
-      </p:sp>
-      <p:sp>
-        <p:nvSpPr>
-          <p:cNvPr id="337" name="Google Shape;337;g30ad953b3ee_0_23:notes"/>
-          <p:cNvSpPr txBox="1"/>
-          <p:nvPr>
-            <p:ph type="body" idx="1"/>
-          </p:nvPr>
-        </p:nvSpPr>
-        <p:spPr>
-          <a:xfrm>
-            <a:off x="685800" y="4343400"/>
-            <a:ext cx="5486400" cy="4114800"/>
-          </a:xfrm>
-          <a:prstGeom prst="rect">
-            <a:avLst/>
-          </a:prstGeom>
-        </p:spPr>
-        <p:txBody>
-          <a:bodyPr spcFirstLastPara="1" wrap="square" lIns="91425" tIns="91425" rIns="91425" bIns="91425" anchor="t" anchorCtr="0">
-            <a:noAutofit/>
-          </a:bodyPr>
-          <a:lstStyle/>
-          <a:p>
-            <a:pPr marL="0" lvl="0" indent="0" algn="l" rtl="0">
-              <a:spcBef>
-                <a:spcPts val="0"/>
-              </a:spcBef>
-              <a:spcAft>
-                <a:spcPts val="0"/>
-              </a:spcAft>
-              <a:buNone/>
-            </a:pPr>
           </a:p>
         </p:txBody>
       </p:sp>
@@ -25686,8 +25688,8 @@
         </p:nvSpPr>
         <p:spPr>
           <a:xfrm>
-            <a:off x="609480" y="1428840"/>
-            <a:ext cx="7619400" cy="4114200"/>
+            <a:off x="609600" y="1428750"/>
+            <a:ext cx="7619365" cy="3459480"/>
           </a:xfrm>
           <a:prstGeom prst="rect">
             <a:avLst/>
@@ -27177,8 +27179,8 @@
         </p:nvSpPr>
         <p:spPr>
           <a:xfrm>
-            <a:off x="609480" y="1428840"/>
-            <a:ext cx="7619400" cy="4114200"/>
+            <a:off x="609600" y="1428750"/>
+            <a:ext cx="7619365" cy="3192780"/>
           </a:xfrm>
           <a:prstGeom prst="rect">
             <a:avLst/>
@@ -31887,380 +31889,6 @@
   <p:cSld>
     <p:spTree>
       <p:nvGrpSpPr>
-        <p:cNvPr id="326" name="Shape 326"/>
-        <p:cNvGrpSpPr/>
-        <p:nvPr/>
-      </p:nvGrpSpPr>
-      <p:grpSpPr>
-        <a:xfrm>
-          <a:off x="0" y="0"/>
-          <a:ext cx="0" cy="0"/>
-          <a:chOff x="0" y="0"/>
-          <a:chExt cx="0" cy="0"/>
-        </a:xfrm>
-      </p:grpSpPr>
-      <p:sp>
-        <p:nvSpPr>
-          <p:cNvPr id="327" name="Google Shape;327;p43"/>
-          <p:cNvSpPr/>
-          <p:nvPr/>
-        </p:nvSpPr>
-        <p:spPr>
-          <a:xfrm>
-            <a:off x="397800" y="16925"/>
-            <a:ext cx="8469000" cy="856500"/>
-          </a:xfrm>
-          <a:prstGeom prst="rect">
-            <a:avLst/>
-          </a:prstGeom>
-          <a:noFill/>
-          <a:ln>
-            <a:noFill/>
-          </a:ln>
-        </p:spPr>
-        <p:txBody>
-          <a:bodyPr spcFirstLastPara="1" wrap="square" lIns="90000" tIns="45000" rIns="90000" bIns="45000" anchor="b" anchorCtr="0">
-            <a:noAutofit/>
-          </a:bodyPr>
-          <a:lstStyle/>
-          <a:p>
-            <a:pPr marL="0" marR="0" lvl="0" indent="0" algn="l" rtl="0">
-              <a:lnSpc>
-                <a:spcPct val="100000"/>
-              </a:lnSpc>
-              <a:spcBef>
-                <a:spcPts val="0"/>
-              </a:spcBef>
-              <a:spcAft>
-                <a:spcPts val="0"/>
-              </a:spcAft>
-              <a:buNone/>
-            </a:pPr>
-            <a:r>
-              <a:rPr lang="en-GB" sz="3200" b="1">
-                <a:solidFill>
-                  <a:srgbClr val="000000"/>
-                </a:solidFill>
-                <a:latin typeface="Calibri" panose="020F0502020204030204"/>
-                <a:ea typeface="Calibri" panose="020F0502020204030204"/>
-                <a:cs typeface="Calibri" panose="020F0502020204030204"/>
-                <a:sym typeface="Calibri" panose="020F0502020204030204"/>
-              </a:rPr>
-              <a:t>Text Normalization</a:t>
-            </a:r>
-            <a:r>
-              <a:rPr lang="en-GB" sz="3200" b="1">
-                <a:latin typeface="Calibri" panose="020F0502020204030204"/>
-                <a:ea typeface="Calibri" panose="020F0502020204030204"/>
-                <a:cs typeface="Calibri" panose="020F0502020204030204"/>
-                <a:sym typeface="Calibri" panose="020F0502020204030204"/>
-              </a:rPr>
-              <a:t>: Typical NLP pipeline </a:t>
-            </a:r>
-            <a:endParaRPr sz="3200">
-              <a:solidFill>
-                <a:schemeClr val="dk1"/>
-              </a:solidFill>
-              <a:latin typeface="Arial" panose="020B0604020202020204"/>
-              <a:ea typeface="Arial" panose="020B0604020202020204"/>
-              <a:cs typeface="Arial" panose="020B0604020202020204"/>
-              <a:sym typeface="Arial" panose="020B0604020202020204"/>
-            </a:endParaRPr>
-          </a:p>
-        </p:txBody>
-      </p:sp>
-      <p:sp>
-        <p:nvSpPr>
-          <p:cNvPr id="328" name="Google Shape;328;p43"/>
-          <p:cNvSpPr/>
-          <p:nvPr/>
-        </p:nvSpPr>
-        <p:spPr>
-          <a:xfrm>
-            <a:off x="269475" y="971650"/>
-            <a:ext cx="8416800" cy="3428400"/>
-          </a:xfrm>
-          <a:prstGeom prst="rect">
-            <a:avLst/>
-          </a:prstGeom>
-          <a:noFill/>
-          <a:ln>
-            <a:noFill/>
-          </a:ln>
-        </p:spPr>
-        <p:txBody>
-          <a:bodyPr spcFirstLastPara="1" wrap="square" lIns="90000" tIns="45000" rIns="90000" bIns="45000" anchor="t" anchorCtr="0">
-            <a:noAutofit/>
-          </a:bodyPr>
-          <a:lstStyle/>
-          <a:p>
-            <a:pPr marL="342900" marR="0" lvl="0" indent="-342900" algn="l" rtl="0">
-              <a:lnSpc>
-                <a:spcPct val="150000"/>
-              </a:lnSpc>
-              <a:spcBef>
-                <a:spcPts val="0"/>
-              </a:spcBef>
-              <a:spcAft>
-                <a:spcPts val="0"/>
-              </a:spcAft>
-              <a:buClr>
-                <a:srgbClr val="CC0000"/>
-              </a:buClr>
-              <a:buSzPts val="3200"/>
-              <a:buFont typeface="Times"/>
-              <a:buChar char="•"/>
-            </a:pPr>
-            <a:r>
-              <a:rPr lang="en-GB" sz="3200">
-                <a:solidFill>
-                  <a:srgbClr val="000000"/>
-                </a:solidFill>
-                <a:latin typeface="Calibri" panose="020F0502020204030204"/>
-                <a:ea typeface="Calibri" panose="020F0502020204030204"/>
-                <a:cs typeface="Calibri" panose="020F0502020204030204"/>
-                <a:sym typeface="Calibri" panose="020F0502020204030204"/>
-              </a:rPr>
-              <a:t>Every NLP task needs to do text </a:t>
-            </a:r>
-            <a:r>
-              <a:rPr lang="en-GB" sz="3200">
-                <a:solidFill>
-                  <a:srgbClr val="000000"/>
-                </a:solidFill>
-                <a:latin typeface="Calibri" panose="020F0502020204030204"/>
-                <a:ea typeface="Calibri" panose="020F0502020204030204"/>
-                <a:cs typeface="Calibri" panose="020F0502020204030204"/>
-                <a:sym typeface="Calibri" panose="020F0502020204030204"/>
-              </a:rPr>
-              <a:t> n</a:t>
-            </a:r>
-            <a:r>
-              <a:rPr lang="en-GB" sz="3200">
-                <a:solidFill>
-                  <a:srgbClr val="000000"/>
-                </a:solidFill>
-                <a:latin typeface="Calibri" panose="020F0502020204030204"/>
-                <a:ea typeface="Calibri" panose="020F0502020204030204"/>
-                <a:cs typeface="Calibri" panose="020F0502020204030204"/>
-                <a:sym typeface="Calibri" panose="020F0502020204030204"/>
-              </a:rPr>
-              <a:t>ormalization: </a:t>
-            </a:r>
-            <a:endParaRPr sz="3200">
-              <a:solidFill>
-                <a:schemeClr val="dk1"/>
-              </a:solidFill>
-              <a:latin typeface="Arial" panose="020B0604020202020204"/>
-              <a:ea typeface="Arial" panose="020B0604020202020204"/>
-              <a:cs typeface="Arial" panose="020B0604020202020204"/>
-              <a:sym typeface="Arial" panose="020B0604020202020204"/>
-            </a:endParaRPr>
-          </a:p>
-          <a:p>
-            <a:pPr marL="914400" marR="0" lvl="1" indent="-457200" algn="l" rtl="0">
-              <a:lnSpc>
-                <a:spcPct val="150000"/>
-              </a:lnSpc>
-              <a:spcBef>
-                <a:spcPts val="600"/>
-              </a:spcBef>
-              <a:spcAft>
-                <a:spcPts val="0"/>
-              </a:spcAft>
-              <a:buClr>
-                <a:srgbClr val="000000"/>
-              </a:buClr>
-              <a:buSzPts val="2800"/>
-              <a:buFont typeface="Calibri" panose="020F0502020204030204"/>
-              <a:buAutoNum type="arabicPeriod"/>
-            </a:pPr>
-            <a:r>
-              <a:rPr lang="en-GB" sz="2800" b="0" i="0" u="none" strike="noStrike" cap="none">
-                <a:solidFill>
-                  <a:srgbClr val="000000"/>
-                </a:solidFill>
-                <a:latin typeface="Calibri" panose="020F0502020204030204"/>
-                <a:ea typeface="Calibri" panose="020F0502020204030204"/>
-                <a:cs typeface="Calibri" panose="020F0502020204030204"/>
-                <a:sym typeface="Calibri" panose="020F0502020204030204"/>
-              </a:rPr>
-              <a:t>Segmenting/tokenizing words in running text</a:t>
-            </a:r>
-            <a:endParaRPr sz="2800" b="0" i="0" u="none" strike="noStrike" cap="none">
-              <a:solidFill>
-                <a:schemeClr val="dk1"/>
-              </a:solidFill>
-              <a:latin typeface="Arial" panose="020B0604020202020204"/>
-              <a:ea typeface="Arial" panose="020B0604020202020204"/>
-              <a:cs typeface="Arial" panose="020B0604020202020204"/>
-              <a:sym typeface="Arial" panose="020B0604020202020204"/>
-            </a:endParaRPr>
-          </a:p>
-          <a:p>
-            <a:pPr marL="914400" marR="0" lvl="1" indent="-457200" algn="l" rtl="0">
-              <a:lnSpc>
-                <a:spcPct val="150000"/>
-              </a:lnSpc>
-              <a:spcBef>
-                <a:spcPts val="600"/>
-              </a:spcBef>
-              <a:spcAft>
-                <a:spcPts val="0"/>
-              </a:spcAft>
-              <a:buClr>
-                <a:srgbClr val="000000"/>
-              </a:buClr>
-              <a:buSzPts val="2800"/>
-              <a:buFont typeface="Calibri" panose="020F0502020204030204"/>
-              <a:buAutoNum type="arabicPeriod"/>
-            </a:pPr>
-            <a:r>
-              <a:rPr lang="en-GB" sz="2800" b="0" i="0" u="none" strike="noStrike" cap="none">
-                <a:solidFill>
-                  <a:srgbClr val="000000"/>
-                </a:solidFill>
-                <a:latin typeface="Calibri" panose="020F0502020204030204"/>
-                <a:ea typeface="Calibri" panose="020F0502020204030204"/>
-                <a:cs typeface="Calibri" panose="020F0502020204030204"/>
-                <a:sym typeface="Calibri" panose="020F0502020204030204"/>
-              </a:rPr>
-              <a:t>Normalizing word formats</a:t>
-            </a:r>
-            <a:endParaRPr sz="2800" b="0" i="0" u="none" strike="noStrike" cap="none">
-              <a:solidFill>
-                <a:schemeClr val="dk1"/>
-              </a:solidFill>
-              <a:latin typeface="Arial" panose="020B0604020202020204"/>
-              <a:ea typeface="Arial" panose="020B0604020202020204"/>
-              <a:cs typeface="Arial" panose="020B0604020202020204"/>
-              <a:sym typeface="Arial" panose="020B0604020202020204"/>
-            </a:endParaRPr>
-          </a:p>
-          <a:p>
-            <a:pPr marL="914400" marR="0" lvl="1" indent="-457200" algn="l" rtl="0">
-              <a:lnSpc>
-                <a:spcPct val="150000"/>
-              </a:lnSpc>
-              <a:spcBef>
-                <a:spcPts val="600"/>
-              </a:spcBef>
-              <a:spcAft>
-                <a:spcPts val="0"/>
-              </a:spcAft>
-              <a:buClr>
-                <a:srgbClr val="000000"/>
-              </a:buClr>
-              <a:buSzPts val="2800"/>
-              <a:buFont typeface="Calibri" panose="020F0502020204030204"/>
-              <a:buAutoNum type="arabicPeriod"/>
-            </a:pPr>
-            <a:r>
-              <a:rPr lang="en-GB" sz="2800" b="0" i="0" u="none" strike="noStrike" cap="none">
-                <a:solidFill>
-                  <a:srgbClr val="000000"/>
-                </a:solidFill>
-                <a:latin typeface="Calibri" panose="020F0502020204030204"/>
-                <a:ea typeface="Calibri" panose="020F0502020204030204"/>
-                <a:cs typeface="Calibri" panose="020F0502020204030204"/>
-                <a:sym typeface="Calibri" panose="020F0502020204030204"/>
-              </a:rPr>
-              <a:t>Segmenting sentences in running text</a:t>
-            </a:r>
-            <a:endParaRPr sz="2800" b="0" i="0" u="none" strike="noStrike" cap="none">
-              <a:solidFill>
-                <a:schemeClr val="dk1"/>
-              </a:solidFill>
-              <a:latin typeface="Arial" panose="020B0604020202020204"/>
-              <a:ea typeface="Arial" panose="020B0604020202020204"/>
-              <a:cs typeface="Arial" panose="020B0604020202020204"/>
-              <a:sym typeface="Arial" panose="020B0604020202020204"/>
-            </a:endParaRPr>
-          </a:p>
-          <a:p>
-            <a:pPr marL="685800" marR="0" lvl="0" indent="-228600" algn="l" rtl="0">
-              <a:lnSpc>
-                <a:spcPct val="90000"/>
-              </a:lnSpc>
-              <a:spcBef>
-                <a:spcPts val="400"/>
-              </a:spcBef>
-              <a:spcAft>
-                <a:spcPts val="0"/>
-              </a:spcAft>
-              <a:buNone/>
-            </a:pPr>
-            <a:endParaRPr sz="2800">
-              <a:solidFill>
-                <a:schemeClr val="dk1"/>
-              </a:solidFill>
-              <a:latin typeface="Arial" panose="020B0604020202020204"/>
-              <a:ea typeface="Arial" panose="020B0604020202020204"/>
-              <a:cs typeface="Arial" panose="020B0604020202020204"/>
-              <a:sym typeface="Arial" panose="020B0604020202020204"/>
-            </a:endParaRPr>
-          </a:p>
-          <a:p>
-            <a:pPr marL="685800" marR="0" lvl="0" indent="-228600" algn="l" rtl="0">
-              <a:lnSpc>
-                <a:spcPct val="90000"/>
-              </a:lnSpc>
-              <a:spcBef>
-                <a:spcPts val="400"/>
-              </a:spcBef>
-              <a:spcAft>
-                <a:spcPts val="0"/>
-              </a:spcAft>
-              <a:buNone/>
-            </a:pPr>
-            <a:endParaRPr sz="2800">
-              <a:solidFill>
-                <a:schemeClr val="dk1"/>
-              </a:solidFill>
-              <a:latin typeface="Arial" panose="020B0604020202020204"/>
-              <a:ea typeface="Arial" panose="020B0604020202020204"/>
-              <a:cs typeface="Arial" panose="020B0604020202020204"/>
-              <a:sym typeface="Arial" panose="020B0604020202020204"/>
-            </a:endParaRPr>
-          </a:p>
-          <a:p>
-            <a:pPr marL="685800" marR="0" lvl="0" indent="-228600" algn="l" rtl="0">
-              <a:lnSpc>
-                <a:spcPct val="90000"/>
-              </a:lnSpc>
-              <a:spcBef>
-                <a:spcPts val="400"/>
-              </a:spcBef>
-              <a:spcAft>
-                <a:spcPts val="0"/>
-              </a:spcAft>
-              <a:buNone/>
-            </a:pPr>
-            <a:endParaRPr sz="2800">
-              <a:solidFill>
-                <a:schemeClr val="dk1"/>
-              </a:solidFill>
-              <a:latin typeface="Arial" panose="020B0604020202020204"/>
-              <a:ea typeface="Arial" panose="020B0604020202020204"/>
-              <a:cs typeface="Arial" panose="020B0604020202020204"/>
-              <a:sym typeface="Arial" panose="020B0604020202020204"/>
-            </a:endParaRPr>
-          </a:p>
-        </p:txBody>
-      </p:sp>
-    </p:spTree>
-  </p:cSld>
-  <p:clrMapOvr>
-    <a:masterClrMapping/>
-  </p:clrMapOvr>
-</p:sld>
-</file>
-
-<file path=ppt/slides/slide38.xml><?xml version="1.0" encoding="utf-8"?>
-<p:sld xmlns:a="http://schemas.openxmlformats.org/drawingml/2006/main" xmlns:r="http://schemas.openxmlformats.org/officeDocument/2006/relationships" xmlns:p="http://schemas.openxmlformats.org/presentationml/2006/main">
-  <p:cSld>
-    <p:spTree>
-      <p:nvGrpSpPr>
         <p:cNvPr id="332" name="Shape 332"/>
         <p:cNvGrpSpPr/>
         <p:nvPr/>
@@ -32496,7 +32124,7 @@
 </p:sld>
 </file>
 
-<file path=ppt/slides/slide39.xml><?xml version="1.0" encoding="utf-8"?>
+<file path=ppt/slides/slide38.xml><?xml version="1.0" encoding="utf-8"?>
 <p:sld xmlns:a="http://schemas.openxmlformats.org/drawingml/2006/main" xmlns:r="http://schemas.openxmlformats.org/officeDocument/2006/relationships" xmlns:p="http://schemas.openxmlformats.org/presentationml/2006/main">
   <p:cSld>
     <p:spTree>
@@ -32579,6 +32207,250 @@
           </a:ln>
         </p:spPr>
       </p:pic>
+    </p:spTree>
+  </p:cSld>
+  <p:clrMapOvr>
+    <a:masterClrMapping/>
+  </p:clrMapOvr>
+</p:sld>
+</file>
+
+<file path=ppt/slides/slide39.xml><?xml version="1.0" encoding="utf-8"?>
+<p:sld xmlns:a="http://schemas.openxmlformats.org/drawingml/2006/main" xmlns:r="http://schemas.openxmlformats.org/officeDocument/2006/relationships" xmlns:p="http://schemas.openxmlformats.org/presentationml/2006/main">
+  <p:cSld>
+    <p:spTree>
+      <p:nvGrpSpPr>
+        <p:cNvPr id="1" name=""/>
+        <p:cNvGrpSpPr/>
+        <p:nvPr/>
+      </p:nvGrpSpPr>
+      <p:grpSpPr/>
+      <p:sp>
+        <p:nvSpPr>
+          <p:cNvPr id="2" name="Title 1"/>
+          <p:cNvSpPr/>
+          <p:nvPr>
+            <p:ph type="title"/>
+          </p:nvPr>
+        </p:nvSpPr>
+        <p:spPr/>
+        <p:txBody>
+          <a:bodyPr>
+            <a:normAutofit fontScale="90000"/>
+          </a:bodyPr>
+          <a:p>
+            <a:r>
+              <a:rPr lang="en-US" altLang="en-GB"/>
+              <a:t>Sentence segmentation </a:t>
+            </a:r>
+            <a:endParaRPr lang="en-US" altLang="en-GB"/>
+          </a:p>
+        </p:txBody>
+      </p:sp>
+      <p:sp>
+        <p:nvSpPr>
+          <p:cNvPr id="3" name="Text Placeholder 2"/>
+          <p:cNvSpPr/>
+          <p:nvPr>
+            <p:ph type="body" idx="1"/>
+          </p:nvPr>
+        </p:nvSpPr>
+        <p:spPr/>
+        <p:txBody>
+          <a:bodyPr/>
+          <a:p>
+            <a:r>
+              <a:rPr lang="en-US" altLang="en-GB"/>
+              <a:t>Sentence segmentation is the process of dividing a text into individual sentences. This is a fundamental task in Natural Language Processing (NLP) and text analysis, as it helps in understanding the structure and meaning of the text.</a:t>
+            </a:r>
+            <a:endParaRPr lang="en-US" altLang="en-GB"/>
+          </a:p>
+        </p:txBody>
+      </p:sp>
+      <p:pic>
+        <p:nvPicPr>
+          <p:cNvPr id="4" name="Picture 3"/>
+          <p:cNvPicPr>
+            <a:picLocks noChangeAspect="1"/>
+          </p:cNvPicPr>
+          <p:nvPr/>
+        </p:nvPicPr>
+        <p:blipFill>
+          <a:blip r:embed="rId1"/>
+          <a:stretch>
+            <a:fillRect/>
+          </a:stretch>
+        </p:blipFill>
+        <p:spPr>
+          <a:xfrm>
+            <a:off x="114935" y="2572385"/>
+            <a:ext cx="6497955" cy="2319655"/>
+          </a:xfrm>
+          <a:prstGeom prst="rect">
+            <a:avLst/>
+          </a:prstGeom>
+          <a:ln>
+            <a:solidFill>
+              <a:schemeClr val="tx1"/>
+            </a:solidFill>
+          </a:ln>
+        </p:spPr>
+      </p:pic>
+      <p:sp>
+        <p:nvSpPr>
+          <p:cNvPr id="5" name="Text Box 4"/>
+          <p:cNvSpPr txBox="1"/>
+          <p:nvPr/>
+        </p:nvSpPr>
+        <p:spPr>
+          <a:xfrm>
+            <a:off x="6221730" y="3736340"/>
+            <a:ext cx="2794635" cy="1322070"/>
+          </a:xfrm>
+          <a:prstGeom prst="rect">
+            <a:avLst/>
+          </a:prstGeom>
+          <a:ln>
+            <a:solidFill>
+              <a:schemeClr val="tx1"/>
+            </a:solidFill>
+          </a:ln>
+        </p:spPr>
+        <p:txBody>
+          <a:bodyPr wrap="square">
+            <a:spAutoFit/>
+          </a:bodyPr>
+          <a:p>
+            <a:pPr marL="0" indent="0" algn="l" fontAlgn="base">
+              <a:spcBef>
+                <a:spcPct val="0"/>
+              </a:spcBef>
+              <a:spcAft>
+                <a:spcPct val="0"/>
+              </a:spcAft>
+            </a:pPr>
+            <a:r>
+              <a:rPr lang="en-US" altLang="zh-CN" sz="1600" b="0" i="0">
+                <a:latin typeface="ui-monospace"/>
+                <a:ea typeface="ui-monospace"/>
+              </a:rPr>
+              <a:t>Hello! </a:t>
+            </a:r>
+            <a:endParaRPr lang="en-US" altLang="zh-CN" sz="1600" b="0" i="0">
+              <a:latin typeface="ui-monospace"/>
+              <a:ea typeface="ui-monospace"/>
+            </a:endParaRPr>
+          </a:p>
+          <a:p>
+            <a:pPr marL="0" indent="0" algn="l" fontAlgn="base">
+              <a:spcBef>
+                <a:spcPct val="0"/>
+              </a:spcBef>
+              <a:spcAft>
+                <a:spcPct val="0"/>
+              </a:spcAft>
+            </a:pPr>
+            <a:r>
+              <a:rPr lang="en-US" altLang="zh-CN" sz="1600" b="0" i="0">
+                <a:solidFill>
+                  <a:srgbClr val="393A34"/>
+                </a:solidFill>
+                <a:latin typeface="ui-monospace"/>
+                <a:ea typeface="ui-monospace"/>
+              </a:rPr>
+              <a:t>My name is John. </a:t>
+            </a:r>
+            <a:endParaRPr lang="en-US" altLang="zh-CN" sz="1600" b="0" i="0">
+              <a:solidFill>
+                <a:srgbClr val="393A34"/>
+              </a:solidFill>
+              <a:latin typeface="ui-monospace"/>
+              <a:ea typeface="ui-monospace"/>
+            </a:endParaRPr>
+          </a:p>
+          <a:p>
+            <a:pPr marL="0" indent="0" algn="l" fontAlgn="base">
+              <a:spcBef>
+                <a:spcPct val="0"/>
+              </a:spcBef>
+              <a:spcAft>
+                <a:spcPct val="0"/>
+              </a:spcAft>
+            </a:pPr>
+            <a:r>
+              <a:rPr lang="en-US" altLang="zh-CN" sz="1600" b="0" i="0">
+                <a:solidFill>
+                  <a:srgbClr val="393A34"/>
+                </a:solidFill>
+                <a:latin typeface="ui-monospace"/>
+                <a:ea typeface="ui-monospace"/>
+              </a:rPr>
+              <a:t>I love programming. </a:t>
+            </a:r>
+            <a:endParaRPr lang="en-US" altLang="zh-CN" sz="1600" b="0" i="0">
+              <a:solidFill>
+                <a:srgbClr val="393A34"/>
+              </a:solidFill>
+              <a:latin typeface="ui-monospace"/>
+              <a:ea typeface="ui-monospace"/>
+            </a:endParaRPr>
+          </a:p>
+          <a:p>
+            <a:pPr marL="0" indent="0" algn="l" fontAlgn="base">
+              <a:spcBef>
+                <a:spcPct val="0"/>
+              </a:spcBef>
+              <a:spcAft>
+                <a:spcPct val="0"/>
+              </a:spcAft>
+            </a:pPr>
+            <a:r>
+              <a:rPr lang="en-US" altLang="zh-CN" sz="1600" b="0" i="0">
+                <a:solidFill>
+                  <a:srgbClr val="393A34"/>
+                </a:solidFill>
+                <a:latin typeface="ui-monospace"/>
+                <a:ea typeface="ui-monospace"/>
+              </a:rPr>
+              <a:t>How about you? </a:t>
+            </a:r>
+            <a:endParaRPr lang="en-US" altLang="zh-CN" sz="1600" b="0" i="0">
+              <a:solidFill>
+                <a:srgbClr val="393A34"/>
+              </a:solidFill>
+              <a:latin typeface="ui-monospace"/>
+              <a:ea typeface="ui-monospace"/>
+            </a:endParaRPr>
+          </a:p>
+          <a:p>
+            <a:pPr marL="0" indent="0" algn="l" fontAlgn="base">
+              <a:spcBef>
+                <a:spcPct val="0"/>
+              </a:spcBef>
+              <a:spcAft>
+                <a:spcPct val="0"/>
+              </a:spcAft>
+            </a:pPr>
+            <a:r>
+              <a:rPr lang="en-US" altLang="zh-CN" sz="1600" b="0" i="0">
+                <a:solidFill>
+                  <a:srgbClr val="393A34"/>
+                </a:solidFill>
+                <a:latin typeface="ui-monospace"/>
+                <a:ea typeface="ui-monospace"/>
+              </a:rPr>
+              <a:t>Let's code together.</a:t>
+            </a:r>
+            <a:endParaRPr lang="en-US" altLang="zh-CN" sz="1600" b="0" i="0">
+              <a:solidFill>
+                <a:srgbClr val="393A34"/>
+              </a:solidFill>
+              <a:latin typeface="ui-monospace"/>
+              <a:ea typeface="ui-monospace"/>
+            </a:endParaRPr>
+          </a:p>
+        </p:txBody>
+      </p:sp>
     </p:spTree>
   </p:cSld>
   <p:clrMapOvr>
@@ -32769,6 +32641,524 @@
   <p:cSld>
     <p:spTree>
       <p:nvGrpSpPr>
+        <p:cNvPr id="1" name=""/>
+        <p:cNvGrpSpPr/>
+        <p:nvPr/>
+      </p:nvGrpSpPr>
+      <p:grpSpPr/>
+      <p:sp>
+        <p:nvSpPr>
+          <p:cNvPr id="2" name="Title 1"/>
+          <p:cNvSpPr/>
+          <p:nvPr>
+            <p:ph type="title"/>
+          </p:nvPr>
+        </p:nvSpPr>
+        <p:spPr/>
+        <p:txBody>
+          <a:bodyPr>
+            <a:normAutofit fontScale="90000"/>
+          </a:bodyPr>
+          <a:p>
+            <a:r>
+              <a:rPr lang="en-US" altLang="en-GB"/>
+              <a:t>Tokenization </a:t>
+            </a:r>
+            <a:endParaRPr lang="en-US" altLang="en-GB"/>
+          </a:p>
+        </p:txBody>
+      </p:sp>
+      <p:sp>
+        <p:nvSpPr>
+          <p:cNvPr id="3" name="Text Placeholder 2"/>
+          <p:cNvSpPr/>
+          <p:nvPr>
+            <p:ph type="body" idx="1"/>
+          </p:nvPr>
+        </p:nvSpPr>
+        <p:spPr/>
+        <p:txBody>
+          <a:bodyPr/>
+          <a:p>
+            <a:pPr marL="114300" indent="0">
+              <a:buNone/>
+            </a:pPr>
+            <a:r>
+              <a:rPr lang="en-US" altLang="en-GB" sz="1600"/>
+              <a:t>Tokenization is the process of breaking down text into smaller units, called tokens. These tokens can be words, phrases, or even sentences, depending on the level of tokenization being applied. In this example, we will perform word tokenization on the provided text.</a:t>
+            </a:r>
+            <a:endParaRPr lang="en-US" altLang="en-GB" sz="1600"/>
+          </a:p>
+          <a:p>
+            <a:endParaRPr lang="en-US" altLang="en-GB" sz="1600"/>
+          </a:p>
+          <a:p>
+            <a:endParaRPr lang="en-US" altLang="en-GB" sz="1600"/>
+          </a:p>
+        </p:txBody>
+      </p:sp>
+      <p:pic>
+        <p:nvPicPr>
+          <p:cNvPr id="4" name="Picture 3"/>
+          <p:cNvPicPr>
+            <a:picLocks noChangeAspect="1"/>
+          </p:cNvPicPr>
+          <p:nvPr/>
+        </p:nvPicPr>
+        <p:blipFill>
+          <a:blip r:embed="rId1"/>
+          <a:stretch>
+            <a:fillRect/>
+          </a:stretch>
+        </p:blipFill>
+        <p:spPr>
+          <a:xfrm>
+            <a:off x="1087120" y="2133600"/>
+            <a:ext cx="6754495" cy="2186305"/>
+          </a:xfrm>
+          <a:prstGeom prst="rect">
+            <a:avLst/>
+          </a:prstGeom>
+          <a:ln>
+            <a:solidFill>
+              <a:schemeClr val="tx1"/>
+            </a:solidFill>
+          </a:ln>
+        </p:spPr>
+      </p:pic>
+      <p:sp>
+        <p:nvSpPr>
+          <p:cNvPr id="5" name="Text Box 4"/>
+          <p:cNvSpPr txBox="1"/>
+          <p:nvPr/>
+        </p:nvSpPr>
+        <p:spPr>
+          <a:xfrm>
+            <a:off x="318770" y="4458970"/>
+            <a:ext cx="8513445" cy="460375"/>
+          </a:xfrm>
+          <a:prstGeom prst="rect">
+            <a:avLst/>
+          </a:prstGeom>
+          <a:ln>
+            <a:solidFill>
+              <a:schemeClr val="tx1"/>
+            </a:solidFill>
+          </a:ln>
+        </p:spPr>
+        <p:txBody>
+          <a:bodyPr wrap="square">
+            <a:spAutoFit/>
+          </a:bodyPr>
+          <a:p>
+            <a:pPr marL="0" indent="0" algn="l"/>
+            <a:r>
+              <a:rPr lang="en-US" altLang="zh-CN" sz="1200" b="0" i="0">
+                <a:solidFill>
+                  <a:srgbClr val="222222"/>
+                </a:solidFill>
+                <a:latin typeface="ui-monospace"/>
+                <a:ea typeface="ui-monospace"/>
+              </a:rPr>
+              <a:t>['Hello', '!', 'My', 'name', 'is', 'John', '.', 'I', 'love', 'programming', '.', 'How', 'about', 'you', '?', 'Let', "'s", 'code', 'together', '.']</a:t>
+            </a:r>
+            <a:endParaRPr lang="en-US" altLang="zh-CN" sz="1200" b="0" i="0">
+              <a:solidFill>
+                <a:srgbClr val="222222"/>
+              </a:solidFill>
+              <a:latin typeface="ui-monospace"/>
+              <a:ea typeface="ui-monospace"/>
+            </a:endParaRPr>
+          </a:p>
+        </p:txBody>
+      </p:sp>
+    </p:spTree>
+  </p:cSld>
+  <p:clrMapOvr>
+    <a:masterClrMapping/>
+  </p:clrMapOvr>
+</p:sld>
+</file>
+
+<file path=ppt/slides/slide41.xml><?xml version="1.0" encoding="utf-8"?>
+<p:sld xmlns:a="http://schemas.openxmlformats.org/drawingml/2006/main" xmlns:r="http://schemas.openxmlformats.org/officeDocument/2006/relationships" xmlns:p="http://schemas.openxmlformats.org/presentationml/2006/main">
+  <p:cSld>
+    <p:spTree>
+      <p:nvGrpSpPr>
+        <p:cNvPr id="326" name="Shape 326"/>
+        <p:cNvGrpSpPr/>
+        <p:nvPr/>
+      </p:nvGrpSpPr>
+      <p:grpSpPr>
+        <a:xfrm>
+          <a:off x="0" y="0"/>
+          <a:ext cx="0" cy="0"/>
+          <a:chOff x="0" y="0"/>
+          <a:chExt cx="0" cy="0"/>
+        </a:xfrm>
+      </p:grpSpPr>
+      <p:sp>
+        <p:nvSpPr>
+          <p:cNvPr id="327" name="Google Shape;327;p43"/>
+          <p:cNvSpPr/>
+          <p:nvPr/>
+        </p:nvSpPr>
+        <p:spPr>
+          <a:xfrm>
+            <a:off x="397800" y="16925"/>
+            <a:ext cx="8469000" cy="856500"/>
+          </a:xfrm>
+          <a:prstGeom prst="rect">
+            <a:avLst/>
+          </a:prstGeom>
+          <a:noFill/>
+          <a:ln>
+            <a:noFill/>
+          </a:ln>
+        </p:spPr>
+        <p:txBody>
+          <a:bodyPr spcFirstLastPara="1" wrap="square" lIns="90000" tIns="45000" rIns="90000" bIns="45000" anchor="b" anchorCtr="0">
+            <a:noAutofit/>
+          </a:bodyPr>
+          <a:lstStyle/>
+          <a:p>
+            <a:pPr marL="0" marR="0" lvl="0" indent="0" algn="l" rtl="0">
+              <a:lnSpc>
+                <a:spcPct val="100000"/>
+              </a:lnSpc>
+              <a:spcBef>
+                <a:spcPts val="0"/>
+              </a:spcBef>
+              <a:spcAft>
+                <a:spcPts val="0"/>
+              </a:spcAft>
+              <a:buNone/>
+            </a:pPr>
+            <a:r>
+              <a:rPr lang="en-GB" sz="3200" b="1">
+                <a:solidFill>
+                  <a:srgbClr val="000000"/>
+                </a:solidFill>
+                <a:latin typeface="Calibri" panose="020F0502020204030204"/>
+                <a:ea typeface="Calibri" panose="020F0502020204030204"/>
+                <a:cs typeface="Calibri" panose="020F0502020204030204"/>
+                <a:sym typeface="Calibri" panose="020F0502020204030204"/>
+              </a:rPr>
+              <a:t>Text Normalization</a:t>
+            </a:r>
+            <a:r>
+              <a:rPr lang="en-GB" sz="3200" b="1">
+                <a:latin typeface="Calibri" panose="020F0502020204030204"/>
+                <a:ea typeface="Calibri" panose="020F0502020204030204"/>
+                <a:cs typeface="Calibri" panose="020F0502020204030204"/>
+                <a:sym typeface="Calibri" panose="020F0502020204030204"/>
+              </a:rPr>
+              <a:t>: Typical NLP pipeline </a:t>
+            </a:r>
+            <a:endParaRPr sz="3200">
+              <a:solidFill>
+                <a:schemeClr val="dk1"/>
+              </a:solidFill>
+              <a:latin typeface="Arial" panose="020B0604020202020204"/>
+              <a:ea typeface="Arial" panose="020B0604020202020204"/>
+              <a:cs typeface="Arial" panose="020B0604020202020204"/>
+              <a:sym typeface="Arial" panose="020B0604020202020204"/>
+            </a:endParaRPr>
+          </a:p>
+        </p:txBody>
+      </p:sp>
+      <p:sp>
+        <p:nvSpPr>
+          <p:cNvPr id="328" name="Google Shape;328;p43"/>
+          <p:cNvSpPr/>
+          <p:nvPr/>
+        </p:nvSpPr>
+        <p:spPr>
+          <a:xfrm>
+            <a:off x="269475" y="971650"/>
+            <a:ext cx="8416800" cy="3428400"/>
+          </a:xfrm>
+          <a:prstGeom prst="rect">
+            <a:avLst/>
+          </a:prstGeom>
+          <a:noFill/>
+          <a:ln>
+            <a:noFill/>
+          </a:ln>
+        </p:spPr>
+        <p:txBody>
+          <a:bodyPr spcFirstLastPara="1" wrap="square" lIns="90000" tIns="45000" rIns="90000" bIns="45000" anchor="t" anchorCtr="0">
+            <a:noAutofit/>
+          </a:bodyPr>
+          <a:lstStyle/>
+          <a:p>
+            <a:pPr marL="342900" marR="0" lvl="0" indent="-342900" algn="l" rtl="0">
+              <a:lnSpc>
+                <a:spcPct val="150000"/>
+              </a:lnSpc>
+              <a:spcBef>
+                <a:spcPts val="0"/>
+              </a:spcBef>
+              <a:spcAft>
+                <a:spcPts val="0"/>
+              </a:spcAft>
+              <a:buClr>
+                <a:srgbClr val="CC0000"/>
+              </a:buClr>
+              <a:buSzPts val="3200"/>
+              <a:buFont typeface="Times"/>
+              <a:buChar char="•"/>
+            </a:pPr>
+            <a:r>
+              <a:rPr lang="en-GB" sz="3200">
+                <a:solidFill>
+                  <a:srgbClr val="000000"/>
+                </a:solidFill>
+                <a:latin typeface="Calibri" panose="020F0502020204030204"/>
+                <a:ea typeface="Calibri" panose="020F0502020204030204"/>
+                <a:cs typeface="Calibri" panose="020F0502020204030204"/>
+                <a:sym typeface="Calibri" panose="020F0502020204030204"/>
+              </a:rPr>
+              <a:t>Every NLP task needs to do text </a:t>
+            </a:r>
+            <a:r>
+              <a:rPr lang="en-GB" sz="3200">
+                <a:solidFill>
+                  <a:srgbClr val="000000"/>
+                </a:solidFill>
+                <a:latin typeface="Calibri" panose="020F0502020204030204"/>
+                <a:ea typeface="Calibri" panose="020F0502020204030204"/>
+                <a:cs typeface="Calibri" panose="020F0502020204030204"/>
+                <a:sym typeface="Calibri" panose="020F0502020204030204"/>
+              </a:rPr>
+              <a:t> n</a:t>
+            </a:r>
+            <a:r>
+              <a:rPr lang="en-GB" sz="3200">
+                <a:solidFill>
+                  <a:srgbClr val="000000"/>
+                </a:solidFill>
+                <a:latin typeface="Calibri" panose="020F0502020204030204"/>
+                <a:ea typeface="Calibri" panose="020F0502020204030204"/>
+                <a:cs typeface="Calibri" panose="020F0502020204030204"/>
+                <a:sym typeface="Calibri" panose="020F0502020204030204"/>
+              </a:rPr>
+              <a:t>ormalization: </a:t>
+            </a:r>
+            <a:endParaRPr sz="3200">
+              <a:solidFill>
+                <a:schemeClr val="dk1"/>
+              </a:solidFill>
+              <a:latin typeface="Arial" panose="020B0604020202020204"/>
+              <a:ea typeface="Arial" panose="020B0604020202020204"/>
+              <a:cs typeface="Arial" panose="020B0604020202020204"/>
+              <a:sym typeface="Arial" panose="020B0604020202020204"/>
+            </a:endParaRPr>
+          </a:p>
+          <a:p>
+            <a:pPr marL="914400" marR="0" lvl="1" indent="-457200" algn="l" rtl="0">
+              <a:lnSpc>
+                <a:spcPct val="150000"/>
+              </a:lnSpc>
+              <a:spcBef>
+                <a:spcPts val="600"/>
+              </a:spcBef>
+              <a:spcAft>
+                <a:spcPts val="0"/>
+              </a:spcAft>
+              <a:buClr>
+                <a:srgbClr val="000000"/>
+              </a:buClr>
+              <a:buSzPts val="2800"/>
+              <a:buFont typeface="Calibri" panose="020F0502020204030204"/>
+              <a:buAutoNum type="arabicPeriod"/>
+            </a:pPr>
+            <a:r>
+              <a:rPr lang="en-GB" sz="2800" b="0" i="0" u="none" strike="noStrike" cap="none">
+                <a:solidFill>
+                  <a:srgbClr val="000000"/>
+                </a:solidFill>
+                <a:latin typeface="Calibri" panose="020F0502020204030204"/>
+                <a:ea typeface="Calibri" panose="020F0502020204030204"/>
+                <a:cs typeface="Calibri" panose="020F0502020204030204"/>
+                <a:sym typeface="Calibri" panose="020F0502020204030204"/>
+              </a:rPr>
+              <a:t>Segmenting/tokenizing words in running text</a:t>
+            </a:r>
+            <a:endParaRPr sz="2800" b="0" i="0" u="none" strike="noStrike" cap="none">
+              <a:solidFill>
+                <a:schemeClr val="dk1"/>
+              </a:solidFill>
+              <a:latin typeface="Arial" panose="020B0604020202020204"/>
+              <a:ea typeface="Arial" panose="020B0604020202020204"/>
+              <a:cs typeface="Arial" panose="020B0604020202020204"/>
+              <a:sym typeface="Arial" panose="020B0604020202020204"/>
+            </a:endParaRPr>
+          </a:p>
+          <a:p>
+            <a:pPr marL="914400" marR="0" lvl="1" indent="-457200" algn="l" rtl="0">
+              <a:lnSpc>
+                <a:spcPct val="150000"/>
+              </a:lnSpc>
+              <a:spcBef>
+                <a:spcPts val="600"/>
+              </a:spcBef>
+              <a:spcAft>
+                <a:spcPts val="0"/>
+              </a:spcAft>
+              <a:buClr>
+                <a:srgbClr val="000000"/>
+              </a:buClr>
+              <a:buSzPts val="2800"/>
+              <a:buFont typeface="Calibri" panose="020F0502020204030204"/>
+              <a:buAutoNum type="arabicPeriod"/>
+            </a:pPr>
+            <a:r>
+              <a:rPr lang="en-GB" sz="2800" b="0" i="0" u="none" strike="noStrike" cap="none">
+                <a:solidFill>
+                  <a:srgbClr val="000000"/>
+                </a:solidFill>
+                <a:latin typeface="Calibri" panose="020F0502020204030204"/>
+                <a:ea typeface="Calibri" panose="020F0502020204030204"/>
+                <a:cs typeface="Calibri" panose="020F0502020204030204"/>
+                <a:sym typeface="Calibri" panose="020F0502020204030204"/>
+              </a:rPr>
+              <a:t>Normalizing word formats</a:t>
+            </a:r>
+            <a:endParaRPr sz="2800" b="0" i="0" u="none" strike="noStrike" cap="none">
+              <a:solidFill>
+                <a:schemeClr val="dk1"/>
+              </a:solidFill>
+              <a:latin typeface="Arial" panose="020B0604020202020204"/>
+              <a:ea typeface="Arial" panose="020B0604020202020204"/>
+              <a:cs typeface="Arial" panose="020B0604020202020204"/>
+              <a:sym typeface="Arial" panose="020B0604020202020204"/>
+            </a:endParaRPr>
+          </a:p>
+          <a:p>
+            <a:pPr marL="914400" marR="0" lvl="1" indent="-457200" algn="l" rtl="0">
+              <a:lnSpc>
+                <a:spcPct val="150000"/>
+              </a:lnSpc>
+              <a:spcBef>
+                <a:spcPts val="600"/>
+              </a:spcBef>
+              <a:spcAft>
+                <a:spcPts val="0"/>
+              </a:spcAft>
+              <a:buClr>
+                <a:srgbClr val="000000"/>
+              </a:buClr>
+              <a:buSzPts val="2800"/>
+              <a:buFont typeface="Calibri" panose="020F0502020204030204"/>
+              <a:buAutoNum type="arabicPeriod"/>
+            </a:pPr>
+            <a:r>
+              <a:rPr lang="en-GB" sz="2800" b="0" i="0" u="none" strike="noStrike" cap="none">
+                <a:solidFill>
+                  <a:srgbClr val="000000"/>
+                </a:solidFill>
+                <a:latin typeface="Calibri" panose="020F0502020204030204"/>
+                <a:ea typeface="Calibri" panose="020F0502020204030204"/>
+                <a:cs typeface="Calibri" panose="020F0502020204030204"/>
+                <a:sym typeface="Calibri" panose="020F0502020204030204"/>
+              </a:rPr>
+              <a:t>Segmenting sentences in running text</a:t>
+            </a:r>
+            <a:endParaRPr sz="2800" b="0" i="0" u="none" strike="noStrike" cap="none">
+              <a:solidFill>
+                <a:schemeClr val="dk1"/>
+              </a:solidFill>
+              <a:latin typeface="Arial" panose="020B0604020202020204"/>
+              <a:ea typeface="Arial" panose="020B0604020202020204"/>
+              <a:cs typeface="Arial" panose="020B0604020202020204"/>
+              <a:sym typeface="Arial" panose="020B0604020202020204"/>
+            </a:endParaRPr>
+          </a:p>
+          <a:p>
+            <a:pPr marL="685800" marR="0" lvl="0" indent="-228600" algn="l" rtl="0">
+              <a:lnSpc>
+                <a:spcPct val="90000"/>
+              </a:lnSpc>
+              <a:spcBef>
+                <a:spcPts val="400"/>
+              </a:spcBef>
+              <a:spcAft>
+                <a:spcPts val="0"/>
+              </a:spcAft>
+              <a:buNone/>
+            </a:pPr>
+            <a:endParaRPr sz="2800">
+              <a:solidFill>
+                <a:schemeClr val="dk1"/>
+              </a:solidFill>
+              <a:latin typeface="Arial" panose="020B0604020202020204"/>
+              <a:ea typeface="Arial" panose="020B0604020202020204"/>
+              <a:cs typeface="Arial" panose="020B0604020202020204"/>
+              <a:sym typeface="Arial" panose="020B0604020202020204"/>
+            </a:endParaRPr>
+          </a:p>
+          <a:p>
+            <a:pPr marL="685800" marR="0" lvl="0" indent="-228600" algn="l" rtl="0">
+              <a:lnSpc>
+                <a:spcPct val="90000"/>
+              </a:lnSpc>
+              <a:spcBef>
+                <a:spcPts val="400"/>
+              </a:spcBef>
+              <a:spcAft>
+                <a:spcPts val="0"/>
+              </a:spcAft>
+              <a:buNone/>
+            </a:pPr>
+            <a:endParaRPr sz="2800">
+              <a:solidFill>
+                <a:schemeClr val="dk1"/>
+              </a:solidFill>
+              <a:latin typeface="Arial" panose="020B0604020202020204"/>
+              <a:ea typeface="Arial" panose="020B0604020202020204"/>
+              <a:cs typeface="Arial" panose="020B0604020202020204"/>
+              <a:sym typeface="Arial" panose="020B0604020202020204"/>
+            </a:endParaRPr>
+          </a:p>
+          <a:p>
+            <a:pPr marL="685800" marR="0" lvl="0" indent="-228600" algn="l" rtl="0">
+              <a:lnSpc>
+                <a:spcPct val="90000"/>
+              </a:lnSpc>
+              <a:spcBef>
+                <a:spcPts val="400"/>
+              </a:spcBef>
+              <a:spcAft>
+                <a:spcPts val="0"/>
+              </a:spcAft>
+              <a:buNone/>
+            </a:pPr>
+            <a:endParaRPr sz="2800">
+              <a:solidFill>
+                <a:schemeClr val="dk1"/>
+              </a:solidFill>
+              <a:latin typeface="Arial" panose="020B0604020202020204"/>
+              <a:ea typeface="Arial" panose="020B0604020202020204"/>
+              <a:cs typeface="Arial" panose="020B0604020202020204"/>
+              <a:sym typeface="Arial" panose="020B0604020202020204"/>
+            </a:endParaRPr>
+          </a:p>
+        </p:txBody>
+      </p:sp>
+    </p:spTree>
+  </p:cSld>
+  <p:clrMapOvr>
+    <a:masterClrMapping/>
+  </p:clrMapOvr>
+</p:sld>
+</file>
+
+<file path=ppt/slides/slide42.xml><?xml version="1.0" encoding="utf-8"?>
+<p:sld xmlns:a="http://schemas.openxmlformats.org/drawingml/2006/main" xmlns:r="http://schemas.openxmlformats.org/officeDocument/2006/relationships" xmlns:p="http://schemas.openxmlformats.org/presentationml/2006/main">
+  <p:cSld>
+    <p:spTree>
+      <p:nvGrpSpPr>
         <p:cNvPr id="344" name="Shape 344"/>
         <p:cNvGrpSpPr/>
         <p:nvPr/>
@@ -32855,7 +33245,7 @@
 </p:sld>
 </file>
 
-<file path=ppt/slides/slide41.xml><?xml version="1.0" encoding="utf-8"?>
+<file path=ppt/slides/slide43.xml><?xml version="1.0" encoding="utf-8"?>
 <p:sld xmlns:a="http://schemas.openxmlformats.org/drawingml/2006/main" xmlns:r="http://schemas.openxmlformats.org/officeDocument/2006/relationships" xmlns:p="http://schemas.openxmlformats.org/presentationml/2006/main">
   <p:cSld>
     <p:spTree>
@@ -33393,7 +33783,7 @@
 </p:sld>
 </file>
 
-<file path=ppt/slides/slide42.xml><?xml version="1.0" encoding="utf-8"?>
+<file path=ppt/slides/slide44.xml><?xml version="1.0" encoding="utf-8"?>
 <p:sld xmlns:a="http://schemas.openxmlformats.org/drawingml/2006/main" xmlns:r="http://schemas.openxmlformats.org/officeDocument/2006/relationships" xmlns:p="http://schemas.openxmlformats.org/presentationml/2006/main">
   <p:cSld>
     <p:spTree>
@@ -33779,7 +34169,7 @@
 </p:sld>
 </file>
 
-<file path=ppt/slides/slide43.xml><?xml version="1.0" encoding="utf-8"?>
+<file path=ppt/slides/slide45.xml><?xml version="1.0" encoding="utf-8"?>
 <p:sld xmlns:a="http://schemas.openxmlformats.org/drawingml/2006/main" xmlns:r="http://schemas.openxmlformats.org/officeDocument/2006/relationships" xmlns:p="http://schemas.openxmlformats.org/presentationml/2006/main">
   <p:cSld>
     <p:spTree>
@@ -34303,7 +34693,7 @@
 </p:sld>
 </file>
 
-<file path=ppt/slides/slide44.xml><?xml version="1.0" encoding="utf-8"?>
+<file path=ppt/slides/slide46.xml><?xml version="1.0" encoding="utf-8"?>
 <p:sld xmlns:a="http://schemas.openxmlformats.org/drawingml/2006/main" xmlns:r="http://schemas.openxmlformats.org/officeDocument/2006/relationships" xmlns:p="http://schemas.openxmlformats.org/presentationml/2006/main">
   <p:cSld>
     <p:spTree>
@@ -36181,7 +36571,7 @@
 </p:sld>
 </file>
 
-<file path=ppt/slides/slide45.xml><?xml version="1.0" encoding="utf-8"?>
+<file path=ppt/slides/slide47.xml><?xml version="1.0" encoding="utf-8"?>
 <p:sld xmlns:a="http://schemas.openxmlformats.org/drawingml/2006/main" xmlns:r="http://schemas.openxmlformats.org/officeDocument/2006/relationships" xmlns:p="http://schemas.openxmlformats.org/presentationml/2006/main">
   <p:cSld>
     <p:spTree>
@@ -36828,7 +37218,7 @@
 </p:sld>
 </file>
 
-<file path=ppt/slides/slide46.xml><?xml version="1.0" encoding="utf-8"?>
+<file path=ppt/slides/slide48.xml><?xml version="1.0" encoding="utf-8"?>
 <p:sld xmlns:a="http://schemas.openxmlformats.org/drawingml/2006/main" xmlns:r="http://schemas.openxmlformats.org/officeDocument/2006/relationships" xmlns:p="http://schemas.openxmlformats.org/presentationml/2006/main">
   <p:cSld>
     <p:spTree>
@@ -37403,7 +37793,7 @@
 </p:sld>
 </file>
 
-<file path=ppt/slides/slide47.xml><?xml version="1.0" encoding="utf-8"?>
+<file path=ppt/slides/slide49.xml><?xml version="1.0" encoding="utf-8"?>
 <p:sld xmlns:a="http://schemas.openxmlformats.org/drawingml/2006/main" xmlns:r="http://schemas.openxmlformats.org/officeDocument/2006/relationships" xmlns:p="http://schemas.openxmlformats.org/presentationml/2006/main">
   <p:cSld>
     <p:spTree>
@@ -37901,7 +38291,336 @@
 </p:sld>
 </file>
 
-<file path=ppt/slides/slide48.xml><?xml version="1.0" encoding="utf-8"?>
+<file path=ppt/slides/slide5.xml><?xml version="1.0" encoding="utf-8"?>
+<p:sld xmlns:a="http://schemas.openxmlformats.org/drawingml/2006/main" xmlns:r="http://schemas.openxmlformats.org/officeDocument/2006/relationships" xmlns:p="http://schemas.openxmlformats.org/presentationml/2006/main">
+  <p:cSld>
+    <p:spTree>
+      <p:nvGrpSpPr>
+        <p:cNvPr id="110" name="Shape 110"/>
+        <p:cNvGrpSpPr/>
+        <p:nvPr/>
+      </p:nvGrpSpPr>
+      <p:grpSpPr>
+        <a:xfrm>
+          <a:off x="0" y="0"/>
+          <a:ext cx="0" cy="0"/>
+          <a:chOff x="0" y="0"/>
+          <a:chExt cx="0" cy="0"/>
+        </a:xfrm>
+      </p:grpSpPr>
+      <p:sp>
+        <p:nvSpPr>
+          <p:cNvPr id="111" name="Google Shape;111;p22"/>
+          <p:cNvSpPr/>
+          <p:nvPr>
+            <p:ph type="title"/>
+          </p:nvPr>
+        </p:nvSpPr>
+        <p:spPr>
+          <a:xfrm>
+            <a:off x="520883" y="1115454"/>
+            <a:ext cx="2057400" cy="2057400"/>
+          </a:xfrm>
+          <a:prstGeom prst="ellipse">
+            <a:avLst/>
+          </a:prstGeom>
+          <a:solidFill>
+            <a:srgbClr val="262626"/>
+          </a:solidFill>
+          <a:ln w="174625" cap="flat" cmpd="thinThick">
+            <a:solidFill>
+              <a:srgbClr val="262626"/>
+            </a:solidFill>
+            <a:prstDash val="solid"/>
+            <a:round/>
+            <a:headEnd type="none" w="sm" len="sm"/>
+            <a:tailEnd type="none" w="sm" len="sm"/>
+          </a:ln>
+        </p:spPr>
+        <p:txBody>
+          <a:bodyPr spcFirstLastPara="1" wrap="square" lIns="68575" tIns="34275" rIns="68575" bIns="34275" anchor="ctr" anchorCtr="0">
+            <a:normAutofit/>
+          </a:bodyPr>
+          <a:lstStyle/>
+          <a:p>
+            <a:pPr marL="0" lvl="0" indent="0" algn="ctr" rtl="0">
+              <a:lnSpc>
+                <a:spcPct val="90000"/>
+              </a:lnSpc>
+              <a:spcBef>
+                <a:spcPts val="0"/>
+              </a:spcBef>
+              <a:spcAft>
+                <a:spcPts val="0"/>
+              </a:spcAft>
+              <a:buClr>
+                <a:srgbClr val="FFFFFF"/>
+              </a:buClr>
+              <a:buSzPts val="2000"/>
+              <a:buFont typeface="Calibri" panose="020F0502020204030204"/>
+              <a:buNone/>
+            </a:pPr>
+            <a:r>
+              <a:rPr lang="en-GB" sz="2000">
+                <a:solidFill>
+                  <a:srgbClr val="FFFFFF"/>
+                </a:solidFill>
+              </a:rPr>
+              <a:t>What is Natural Language Processing?</a:t>
+            </a:r>
+            <a:endParaRPr lang="en-GB" sz="2000">
+              <a:solidFill>
+                <a:srgbClr val="FFFFFF"/>
+              </a:solidFill>
+            </a:endParaRPr>
+          </a:p>
+        </p:txBody>
+      </p:sp>
+      <p:pic>
+        <p:nvPicPr>
+          <p:cNvPr id="112" name="Google Shape;112;p22" descr="A screenshot of a cell phone&#10;&#10;Description automatically generated"/>
+          <p:cNvPicPr preferRelativeResize="0"/>
+          <p:nvPr/>
+        </p:nvPicPr>
+        <p:blipFill rotWithShape="1">
+          <a:blip r:embed="rId1"/>
+          <a:srcRect/>
+          <a:stretch>
+            <a:fillRect/>
+          </a:stretch>
+        </p:blipFill>
+        <p:spPr>
+          <a:xfrm>
+            <a:off x="3261989" y="707439"/>
+            <a:ext cx="5070890" cy="1749456"/>
+          </a:xfrm>
+          <a:prstGeom prst="rect">
+            <a:avLst/>
+          </a:prstGeom>
+          <a:noFill/>
+          <a:ln>
+            <a:noFill/>
+          </a:ln>
+        </p:spPr>
+      </p:pic>
+      <p:sp>
+        <p:nvSpPr>
+          <p:cNvPr id="113" name="Google Shape;113;p22"/>
+          <p:cNvSpPr txBox="1"/>
+          <p:nvPr>
+            <p:ph type="body" idx="1"/>
+          </p:nvPr>
+        </p:nvSpPr>
+        <p:spPr>
+          <a:xfrm>
+            <a:off x="3073774" y="3017804"/>
+            <a:ext cx="5740800" cy="497700"/>
+          </a:xfrm>
+          <a:prstGeom prst="rect">
+            <a:avLst/>
+          </a:prstGeom>
+          <a:noFill/>
+          <a:ln>
+            <a:noFill/>
+          </a:ln>
+        </p:spPr>
+        <p:txBody>
+          <a:bodyPr spcFirstLastPara="1" wrap="square" lIns="68575" tIns="34275" rIns="68575" bIns="34275" anchor="t" anchorCtr="0">
+            <a:normAutofit fontScale="25000" lnSpcReduction="20000"/>
+          </a:bodyPr>
+          <a:lstStyle/>
+          <a:p>
+            <a:pPr marL="0" lvl="0" indent="0" algn="l" rtl="0">
+              <a:lnSpc>
+                <a:spcPct val="90000"/>
+              </a:lnSpc>
+              <a:spcBef>
+                <a:spcPts val="0"/>
+              </a:spcBef>
+              <a:spcAft>
+                <a:spcPts val="0"/>
+              </a:spcAft>
+              <a:buClr>
+                <a:schemeClr val="dk1"/>
+              </a:buClr>
+              <a:buSzPct val="36000"/>
+              <a:buNone/>
+            </a:pPr>
+            <a:r>
+              <a:rPr lang="en-GB" sz="6680"/>
+              <a:t>Computers using natural language as input and/or output</a:t>
+            </a:r>
+            <a:endParaRPr sz="6080"/>
+          </a:p>
+          <a:p>
+            <a:pPr marL="177800" lvl="0" indent="-114300" algn="l" rtl="0">
+              <a:lnSpc>
+                <a:spcPct val="90000"/>
+              </a:lnSpc>
+              <a:spcBef>
+                <a:spcPts val="800"/>
+              </a:spcBef>
+              <a:spcAft>
+                <a:spcPts val="0"/>
+              </a:spcAft>
+              <a:buClr>
+                <a:schemeClr val="dk1"/>
+              </a:buClr>
+              <a:buSzPct val="100000"/>
+              <a:buNone/>
+            </a:pPr>
+            <a:endParaRPr sz="1400"/>
+          </a:p>
+          <a:p>
+            <a:pPr marL="177800" lvl="0" indent="-114300" algn="l" rtl="0">
+              <a:lnSpc>
+                <a:spcPct val="90000"/>
+              </a:lnSpc>
+              <a:spcBef>
+                <a:spcPts val="800"/>
+              </a:spcBef>
+              <a:spcAft>
+                <a:spcPts val="1200"/>
+              </a:spcAft>
+              <a:buClr>
+                <a:schemeClr val="dk1"/>
+              </a:buClr>
+              <a:buSzPct val="100000"/>
+              <a:buNone/>
+            </a:pPr>
+            <a:endParaRPr sz="1400"/>
+          </a:p>
+        </p:txBody>
+      </p:sp>
+      <p:sp>
+        <p:nvSpPr>
+          <p:cNvPr id="114" name="Google Shape;114;p22"/>
+          <p:cNvSpPr txBox="1"/>
+          <p:nvPr/>
+        </p:nvSpPr>
+        <p:spPr>
+          <a:xfrm>
+            <a:off x="4514150" y="3881762"/>
+            <a:ext cx="2323800" cy="497700"/>
+          </a:xfrm>
+          <a:prstGeom prst="rect">
+            <a:avLst/>
+          </a:prstGeom>
+          <a:noFill/>
+          <a:ln w="9525" cap="flat" cmpd="sng">
+            <a:solidFill>
+              <a:schemeClr val="dk1"/>
+            </a:solidFill>
+            <a:prstDash val="solid"/>
+            <a:round/>
+            <a:headEnd type="none" w="sm" len="sm"/>
+            <a:tailEnd type="none" w="sm" len="sm"/>
+          </a:ln>
+        </p:spPr>
+        <p:txBody>
+          <a:bodyPr spcFirstLastPara="1" wrap="square" lIns="68575" tIns="34275" rIns="68575" bIns="34275" anchor="t" anchorCtr="0">
+            <a:normAutofit fontScale="25000" lnSpcReduction="20000"/>
+          </a:bodyPr>
+          <a:lstStyle/>
+          <a:p>
+            <a:pPr marL="0" marR="0" lvl="0" indent="0" algn="l" rtl="0">
+              <a:lnSpc>
+                <a:spcPct val="90000"/>
+              </a:lnSpc>
+              <a:spcBef>
+                <a:spcPts val="0"/>
+              </a:spcBef>
+              <a:spcAft>
+                <a:spcPts val="0"/>
+              </a:spcAft>
+              <a:buClr>
+                <a:schemeClr val="dk1"/>
+              </a:buClr>
+              <a:buSzPct val="26000"/>
+              <a:buFont typeface="Arial" panose="020B0604020202020204"/>
+              <a:buNone/>
+            </a:pPr>
+            <a:r>
+              <a:rPr lang="en-GB" sz="9080" b="0" i="0" u="none" strike="noStrike" cap="none">
+                <a:solidFill>
+                  <a:schemeClr val="dk1"/>
+                </a:solidFill>
+                <a:latin typeface="Calibri" panose="020F0502020204030204"/>
+                <a:ea typeface="Calibri" panose="020F0502020204030204"/>
+                <a:cs typeface="Calibri" panose="020F0502020204030204"/>
+                <a:sym typeface="Calibri" panose="020F0502020204030204"/>
+              </a:rPr>
+              <a:t>NLP = NLU + NLG</a:t>
+            </a:r>
+            <a:endParaRPr sz="7780"/>
+          </a:p>
+          <a:p>
+            <a:pPr marL="177800" marR="0" lvl="0" indent="-88900" algn="l" rtl="0">
+              <a:lnSpc>
+                <a:spcPct val="90000"/>
+              </a:lnSpc>
+              <a:spcBef>
+                <a:spcPts val="800"/>
+              </a:spcBef>
+              <a:spcAft>
+                <a:spcPts val="0"/>
+              </a:spcAft>
+              <a:buClr>
+                <a:schemeClr val="dk1"/>
+              </a:buClr>
+              <a:buSzPct val="100000"/>
+              <a:buFont typeface="Arial" panose="020B0604020202020204"/>
+              <a:buNone/>
+            </a:pPr>
+            <a:endParaRPr sz="1400" b="0" i="0" u="none" strike="noStrike" cap="none">
+              <a:solidFill>
+                <a:schemeClr val="dk1"/>
+              </a:solidFill>
+              <a:latin typeface="Calibri" panose="020F0502020204030204"/>
+              <a:ea typeface="Calibri" panose="020F0502020204030204"/>
+              <a:cs typeface="Calibri" panose="020F0502020204030204"/>
+              <a:sym typeface="Calibri" panose="020F0502020204030204"/>
+            </a:endParaRPr>
+          </a:p>
+          <a:p>
+            <a:pPr marL="177800" marR="0" lvl="0" indent="-88900" algn="l" rtl="0">
+              <a:lnSpc>
+                <a:spcPct val="90000"/>
+              </a:lnSpc>
+              <a:spcBef>
+                <a:spcPts val="800"/>
+              </a:spcBef>
+              <a:spcAft>
+                <a:spcPts val="0"/>
+              </a:spcAft>
+              <a:buClr>
+                <a:schemeClr val="dk1"/>
+              </a:buClr>
+              <a:buSzPct val="100000"/>
+              <a:buFont typeface="Arial" panose="020B0604020202020204"/>
+              <a:buNone/>
+            </a:pPr>
+            <a:endParaRPr sz="1400" b="0" i="0" u="none" strike="noStrike" cap="none">
+              <a:solidFill>
+                <a:schemeClr val="dk1"/>
+              </a:solidFill>
+              <a:latin typeface="Calibri" panose="020F0502020204030204"/>
+              <a:ea typeface="Calibri" panose="020F0502020204030204"/>
+              <a:cs typeface="Calibri" panose="020F0502020204030204"/>
+              <a:sym typeface="Calibri" panose="020F0502020204030204"/>
+            </a:endParaRPr>
+          </a:p>
+        </p:txBody>
+      </p:sp>
+    </p:spTree>
+  </p:cSld>
+  <p:clrMapOvr>
+    <a:masterClrMapping/>
+  </p:clrMapOvr>
+</p:sld>
+</file>
+
+<file path=ppt/slides/slide50.xml><?xml version="1.0" encoding="utf-8"?>
 <p:sld xmlns:a="http://schemas.openxmlformats.org/drawingml/2006/main" xmlns:r="http://schemas.openxmlformats.org/officeDocument/2006/relationships" xmlns:p="http://schemas.openxmlformats.org/presentationml/2006/main">
   <p:cSld>
     <p:spTree>
@@ -38265,7 +38984,7 @@
 </p:sld>
 </file>
 
-<file path=ppt/slides/slide49.xml><?xml version="1.0" encoding="utf-8"?>
+<file path=ppt/slides/slide51.xml><?xml version="1.0" encoding="utf-8"?>
 <p:sld xmlns:a="http://schemas.openxmlformats.org/drawingml/2006/main" xmlns:r="http://schemas.openxmlformats.org/officeDocument/2006/relationships" xmlns:p="http://schemas.openxmlformats.org/presentationml/2006/main">
   <p:cSld>
     <p:spTree>
@@ -39033,336 +39752,7 @@
 </p:sld>
 </file>
 
-<file path=ppt/slides/slide5.xml><?xml version="1.0" encoding="utf-8"?>
-<p:sld xmlns:a="http://schemas.openxmlformats.org/drawingml/2006/main" xmlns:r="http://schemas.openxmlformats.org/officeDocument/2006/relationships" xmlns:p="http://schemas.openxmlformats.org/presentationml/2006/main">
-  <p:cSld>
-    <p:spTree>
-      <p:nvGrpSpPr>
-        <p:cNvPr id="110" name="Shape 110"/>
-        <p:cNvGrpSpPr/>
-        <p:nvPr/>
-      </p:nvGrpSpPr>
-      <p:grpSpPr>
-        <a:xfrm>
-          <a:off x="0" y="0"/>
-          <a:ext cx="0" cy="0"/>
-          <a:chOff x="0" y="0"/>
-          <a:chExt cx="0" cy="0"/>
-        </a:xfrm>
-      </p:grpSpPr>
-      <p:sp>
-        <p:nvSpPr>
-          <p:cNvPr id="111" name="Google Shape;111;p22"/>
-          <p:cNvSpPr/>
-          <p:nvPr>
-            <p:ph type="title"/>
-          </p:nvPr>
-        </p:nvSpPr>
-        <p:spPr>
-          <a:xfrm>
-            <a:off x="520883" y="1115454"/>
-            <a:ext cx="2057400" cy="2057400"/>
-          </a:xfrm>
-          <a:prstGeom prst="ellipse">
-            <a:avLst/>
-          </a:prstGeom>
-          <a:solidFill>
-            <a:srgbClr val="262626"/>
-          </a:solidFill>
-          <a:ln w="174625" cap="flat" cmpd="thinThick">
-            <a:solidFill>
-              <a:srgbClr val="262626"/>
-            </a:solidFill>
-            <a:prstDash val="solid"/>
-            <a:round/>
-            <a:headEnd type="none" w="sm" len="sm"/>
-            <a:tailEnd type="none" w="sm" len="sm"/>
-          </a:ln>
-        </p:spPr>
-        <p:txBody>
-          <a:bodyPr spcFirstLastPara="1" wrap="square" lIns="68575" tIns="34275" rIns="68575" bIns="34275" anchor="ctr" anchorCtr="0">
-            <a:normAutofit/>
-          </a:bodyPr>
-          <a:lstStyle/>
-          <a:p>
-            <a:pPr marL="0" lvl="0" indent="0" algn="ctr" rtl="0">
-              <a:lnSpc>
-                <a:spcPct val="90000"/>
-              </a:lnSpc>
-              <a:spcBef>
-                <a:spcPts val="0"/>
-              </a:spcBef>
-              <a:spcAft>
-                <a:spcPts val="0"/>
-              </a:spcAft>
-              <a:buClr>
-                <a:srgbClr val="FFFFFF"/>
-              </a:buClr>
-              <a:buSzPts val="2000"/>
-              <a:buFont typeface="Calibri" panose="020F0502020204030204"/>
-              <a:buNone/>
-            </a:pPr>
-            <a:r>
-              <a:rPr lang="en-GB" sz="2000">
-                <a:solidFill>
-                  <a:srgbClr val="FFFFFF"/>
-                </a:solidFill>
-              </a:rPr>
-              <a:t>What is Natural Language Processing?</a:t>
-            </a:r>
-            <a:endParaRPr lang="en-GB" sz="2000">
-              <a:solidFill>
-                <a:srgbClr val="FFFFFF"/>
-              </a:solidFill>
-            </a:endParaRPr>
-          </a:p>
-        </p:txBody>
-      </p:sp>
-      <p:pic>
-        <p:nvPicPr>
-          <p:cNvPr id="112" name="Google Shape;112;p22" descr="A screenshot of a cell phone&#10;&#10;Description automatically generated"/>
-          <p:cNvPicPr preferRelativeResize="0"/>
-          <p:nvPr/>
-        </p:nvPicPr>
-        <p:blipFill rotWithShape="1">
-          <a:blip r:embed="rId1"/>
-          <a:srcRect/>
-          <a:stretch>
-            <a:fillRect/>
-          </a:stretch>
-        </p:blipFill>
-        <p:spPr>
-          <a:xfrm>
-            <a:off x="3261989" y="707439"/>
-            <a:ext cx="5070890" cy="1749456"/>
-          </a:xfrm>
-          <a:prstGeom prst="rect">
-            <a:avLst/>
-          </a:prstGeom>
-          <a:noFill/>
-          <a:ln>
-            <a:noFill/>
-          </a:ln>
-        </p:spPr>
-      </p:pic>
-      <p:sp>
-        <p:nvSpPr>
-          <p:cNvPr id="113" name="Google Shape;113;p22"/>
-          <p:cNvSpPr txBox="1"/>
-          <p:nvPr>
-            <p:ph type="body" idx="1"/>
-          </p:nvPr>
-        </p:nvSpPr>
-        <p:spPr>
-          <a:xfrm>
-            <a:off x="3073774" y="3017804"/>
-            <a:ext cx="5740800" cy="497700"/>
-          </a:xfrm>
-          <a:prstGeom prst="rect">
-            <a:avLst/>
-          </a:prstGeom>
-          <a:noFill/>
-          <a:ln>
-            <a:noFill/>
-          </a:ln>
-        </p:spPr>
-        <p:txBody>
-          <a:bodyPr spcFirstLastPara="1" wrap="square" lIns="68575" tIns="34275" rIns="68575" bIns="34275" anchor="t" anchorCtr="0">
-            <a:normAutofit fontScale="25000" lnSpcReduction="20000"/>
-          </a:bodyPr>
-          <a:lstStyle/>
-          <a:p>
-            <a:pPr marL="0" lvl="0" indent="0" algn="l" rtl="0">
-              <a:lnSpc>
-                <a:spcPct val="90000"/>
-              </a:lnSpc>
-              <a:spcBef>
-                <a:spcPts val="0"/>
-              </a:spcBef>
-              <a:spcAft>
-                <a:spcPts val="0"/>
-              </a:spcAft>
-              <a:buClr>
-                <a:schemeClr val="dk1"/>
-              </a:buClr>
-              <a:buSzPct val="36000"/>
-              <a:buNone/>
-            </a:pPr>
-            <a:r>
-              <a:rPr lang="en-GB" sz="6680"/>
-              <a:t>Computers using natural language as input and/or output</a:t>
-            </a:r>
-            <a:endParaRPr sz="6080"/>
-          </a:p>
-          <a:p>
-            <a:pPr marL="177800" lvl="0" indent="-114300" algn="l" rtl="0">
-              <a:lnSpc>
-                <a:spcPct val="90000"/>
-              </a:lnSpc>
-              <a:spcBef>
-                <a:spcPts val="800"/>
-              </a:spcBef>
-              <a:spcAft>
-                <a:spcPts val="0"/>
-              </a:spcAft>
-              <a:buClr>
-                <a:schemeClr val="dk1"/>
-              </a:buClr>
-              <a:buSzPct val="100000"/>
-              <a:buNone/>
-            </a:pPr>
-            <a:endParaRPr sz="1400"/>
-          </a:p>
-          <a:p>
-            <a:pPr marL="177800" lvl="0" indent="-114300" algn="l" rtl="0">
-              <a:lnSpc>
-                <a:spcPct val="90000"/>
-              </a:lnSpc>
-              <a:spcBef>
-                <a:spcPts val="800"/>
-              </a:spcBef>
-              <a:spcAft>
-                <a:spcPts val="1200"/>
-              </a:spcAft>
-              <a:buClr>
-                <a:schemeClr val="dk1"/>
-              </a:buClr>
-              <a:buSzPct val="100000"/>
-              <a:buNone/>
-            </a:pPr>
-            <a:endParaRPr sz="1400"/>
-          </a:p>
-        </p:txBody>
-      </p:sp>
-      <p:sp>
-        <p:nvSpPr>
-          <p:cNvPr id="114" name="Google Shape;114;p22"/>
-          <p:cNvSpPr txBox="1"/>
-          <p:nvPr/>
-        </p:nvSpPr>
-        <p:spPr>
-          <a:xfrm>
-            <a:off x="4514150" y="3881762"/>
-            <a:ext cx="2323800" cy="497700"/>
-          </a:xfrm>
-          <a:prstGeom prst="rect">
-            <a:avLst/>
-          </a:prstGeom>
-          <a:noFill/>
-          <a:ln w="9525" cap="flat" cmpd="sng">
-            <a:solidFill>
-              <a:schemeClr val="dk1"/>
-            </a:solidFill>
-            <a:prstDash val="solid"/>
-            <a:round/>
-            <a:headEnd type="none" w="sm" len="sm"/>
-            <a:tailEnd type="none" w="sm" len="sm"/>
-          </a:ln>
-        </p:spPr>
-        <p:txBody>
-          <a:bodyPr spcFirstLastPara="1" wrap="square" lIns="68575" tIns="34275" rIns="68575" bIns="34275" anchor="t" anchorCtr="0">
-            <a:normAutofit fontScale="25000" lnSpcReduction="20000"/>
-          </a:bodyPr>
-          <a:lstStyle/>
-          <a:p>
-            <a:pPr marL="0" marR="0" lvl="0" indent="0" algn="l" rtl="0">
-              <a:lnSpc>
-                <a:spcPct val="90000"/>
-              </a:lnSpc>
-              <a:spcBef>
-                <a:spcPts val="0"/>
-              </a:spcBef>
-              <a:spcAft>
-                <a:spcPts val="0"/>
-              </a:spcAft>
-              <a:buClr>
-                <a:schemeClr val="dk1"/>
-              </a:buClr>
-              <a:buSzPct val="26000"/>
-              <a:buFont typeface="Arial" panose="020B0604020202020204"/>
-              <a:buNone/>
-            </a:pPr>
-            <a:r>
-              <a:rPr lang="en-GB" sz="9080" b="0" i="0" u="none" strike="noStrike" cap="none">
-                <a:solidFill>
-                  <a:schemeClr val="dk1"/>
-                </a:solidFill>
-                <a:latin typeface="Calibri" panose="020F0502020204030204"/>
-                <a:ea typeface="Calibri" panose="020F0502020204030204"/>
-                <a:cs typeface="Calibri" panose="020F0502020204030204"/>
-                <a:sym typeface="Calibri" panose="020F0502020204030204"/>
-              </a:rPr>
-              <a:t>NLP = NLU + NLG</a:t>
-            </a:r>
-            <a:endParaRPr sz="7780"/>
-          </a:p>
-          <a:p>
-            <a:pPr marL="177800" marR="0" lvl="0" indent="-88900" algn="l" rtl="0">
-              <a:lnSpc>
-                <a:spcPct val="90000"/>
-              </a:lnSpc>
-              <a:spcBef>
-                <a:spcPts val="800"/>
-              </a:spcBef>
-              <a:spcAft>
-                <a:spcPts val="0"/>
-              </a:spcAft>
-              <a:buClr>
-                <a:schemeClr val="dk1"/>
-              </a:buClr>
-              <a:buSzPct val="100000"/>
-              <a:buFont typeface="Arial" panose="020B0604020202020204"/>
-              <a:buNone/>
-            </a:pPr>
-            <a:endParaRPr sz="1400" b="0" i="0" u="none" strike="noStrike" cap="none">
-              <a:solidFill>
-                <a:schemeClr val="dk1"/>
-              </a:solidFill>
-              <a:latin typeface="Calibri" panose="020F0502020204030204"/>
-              <a:ea typeface="Calibri" panose="020F0502020204030204"/>
-              <a:cs typeface="Calibri" panose="020F0502020204030204"/>
-              <a:sym typeface="Calibri" panose="020F0502020204030204"/>
-            </a:endParaRPr>
-          </a:p>
-          <a:p>
-            <a:pPr marL="177800" marR="0" lvl="0" indent="-88900" algn="l" rtl="0">
-              <a:lnSpc>
-                <a:spcPct val="90000"/>
-              </a:lnSpc>
-              <a:spcBef>
-                <a:spcPts val="800"/>
-              </a:spcBef>
-              <a:spcAft>
-                <a:spcPts val="0"/>
-              </a:spcAft>
-              <a:buClr>
-                <a:schemeClr val="dk1"/>
-              </a:buClr>
-              <a:buSzPct val="100000"/>
-              <a:buFont typeface="Arial" panose="020B0604020202020204"/>
-              <a:buNone/>
-            </a:pPr>
-            <a:endParaRPr sz="1400" b="0" i="0" u="none" strike="noStrike" cap="none">
-              <a:solidFill>
-                <a:schemeClr val="dk1"/>
-              </a:solidFill>
-              <a:latin typeface="Calibri" panose="020F0502020204030204"/>
-              <a:ea typeface="Calibri" panose="020F0502020204030204"/>
-              <a:cs typeface="Calibri" panose="020F0502020204030204"/>
-              <a:sym typeface="Calibri" panose="020F0502020204030204"/>
-            </a:endParaRPr>
-          </a:p>
-        </p:txBody>
-      </p:sp>
-    </p:spTree>
-  </p:cSld>
-  <p:clrMapOvr>
-    <a:masterClrMapping/>
-  </p:clrMapOvr>
-</p:sld>
-</file>
-
-<file path=ppt/slides/slide50.xml><?xml version="1.0" encoding="utf-8"?>
+<file path=ppt/slides/slide52.xml><?xml version="1.0" encoding="utf-8"?>
 <p:sld xmlns:a="http://schemas.openxmlformats.org/drawingml/2006/main" xmlns:r="http://schemas.openxmlformats.org/officeDocument/2006/relationships" xmlns:p="http://schemas.openxmlformats.org/presentationml/2006/main">
   <p:cSld>
     <p:spTree>
@@ -39499,7 +39889,7 @@
 </p:sld>
 </file>
 
-<file path=ppt/slides/slide51.xml><?xml version="1.0" encoding="utf-8"?>
+<file path=ppt/slides/slide53.xml><?xml version="1.0" encoding="utf-8"?>
 <p:sld xmlns:a="http://schemas.openxmlformats.org/drawingml/2006/main" xmlns:r="http://schemas.openxmlformats.org/officeDocument/2006/relationships" xmlns:p="http://schemas.openxmlformats.org/presentationml/2006/main">
   <p:cSld>
     <p:spTree>
@@ -39834,7 +40224,7 @@
 </p:sld>
 </file>
 
-<file path=ppt/slides/slide52.xml><?xml version="1.0" encoding="utf-8"?>
+<file path=ppt/slides/slide54.xml><?xml version="1.0" encoding="utf-8"?>
 <p:sld xmlns:a="http://schemas.openxmlformats.org/drawingml/2006/main" xmlns:r="http://schemas.openxmlformats.org/officeDocument/2006/relationships" xmlns:p="http://schemas.openxmlformats.org/presentationml/2006/main">
   <p:cSld>
     <p:spTree>
@@ -40483,7 +40873,7 @@
 </p:sld>
 </file>
 
-<file path=ppt/slides/slide53.xml><?xml version="1.0" encoding="utf-8"?>
+<file path=ppt/slides/slide55.xml><?xml version="1.0" encoding="utf-8"?>
 <p:sld xmlns:a="http://schemas.openxmlformats.org/drawingml/2006/main" xmlns:r="http://schemas.openxmlformats.org/officeDocument/2006/relationships" xmlns:p="http://schemas.openxmlformats.org/presentationml/2006/main">
   <p:cSld>
     <p:spTree>
@@ -40999,7 +41389,7 @@
 </p:sld>
 </file>
 
-<file path=ppt/slides/slide54.xml><?xml version="1.0" encoding="utf-8"?>
+<file path=ppt/slides/slide56.xml><?xml version="1.0" encoding="utf-8"?>
 <p:sld xmlns:a="http://schemas.openxmlformats.org/drawingml/2006/main" xmlns:r="http://schemas.openxmlformats.org/officeDocument/2006/relationships" xmlns:p="http://schemas.openxmlformats.org/presentationml/2006/main">
   <p:cSld>
     <p:spTree>
@@ -41651,7 +42041,7 @@
 </p:sld>
 </file>
 
-<file path=ppt/slides/slide55.xml><?xml version="1.0" encoding="utf-8"?>
+<file path=ppt/slides/slide57.xml><?xml version="1.0" encoding="utf-8"?>
 <p:sld xmlns:a="http://schemas.openxmlformats.org/drawingml/2006/main" xmlns:r="http://schemas.openxmlformats.org/officeDocument/2006/relationships" xmlns:p="http://schemas.openxmlformats.org/presentationml/2006/main">
   <p:cSld>
     <p:spTree>
@@ -41984,7 +42374,7 @@
 </p:sld>
 </file>
 
-<file path=ppt/slides/slide56.xml><?xml version="1.0" encoding="utf-8"?>
+<file path=ppt/slides/slide58.xml><?xml version="1.0" encoding="utf-8"?>
 <p:sld xmlns:a="http://schemas.openxmlformats.org/drawingml/2006/main" xmlns:r="http://schemas.openxmlformats.org/officeDocument/2006/relationships" xmlns:p="http://schemas.openxmlformats.org/presentationml/2006/main">
   <p:cSld>
     <p:spTree>
@@ -42865,7 +43255,7 @@
 </p:sld>
 </file>
 
-<file path=ppt/slides/slide57.xml><?xml version="1.0" encoding="utf-8"?>
+<file path=ppt/slides/slide59.xml><?xml version="1.0" encoding="utf-8"?>
 <p:sld xmlns:a="http://schemas.openxmlformats.org/drawingml/2006/main" xmlns:r="http://schemas.openxmlformats.org/officeDocument/2006/relationships" xmlns:p="http://schemas.openxmlformats.org/presentationml/2006/main">
   <p:cSld>
     <p:spTree>
@@ -43781,7 +44171,601 @@
 </p:sld>
 </file>
 
-<file path=ppt/slides/slide58.xml><?xml version="1.0" encoding="utf-8"?>
+<file path=ppt/slides/slide6.xml><?xml version="1.0" encoding="utf-8"?>
+<p:sld xmlns:a="http://schemas.openxmlformats.org/drawingml/2006/main" xmlns:r="http://schemas.openxmlformats.org/officeDocument/2006/relationships" xmlns:p="http://schemas.openxmlformats.org/presentationml/2006/main">
+  <p:cSld>
+    <p:spTree>
+      <p:nvGrpSpPr>
+        <p:cNvPr id="97" name="Shape 97"/>
+        <p:cNvGrpSpPr/>
+        <p:nvPr/>
+      </p:nvGrpSpPr>
+      <p:grpSpPr>
+        <a:xfrm>
+          <a:off x="0" y="0"/>
+          <a:ext cx="0" cy="0"/>
+          <a:chOff x="0" y="0"/>
+          <a:chExt cx="0" cy="0"/>
+        </a:xfrm>
+      </p:grpSpPr>
+      <p:sp>
+        <p:nvSpPr>
+          <p:cNvPr id="98" name="Google Shape;98;p20"/>
+          <p:cNvSpPr txBox="1"/>
+          <p:nvPr>
+            <p:ph type="title"/>
+          </p:nvPr>
+        </p:nvSpPr>
+        <p:spPr>
+          <a:xfrm>
+            <a:off x="311700" y="445025"/>
+            <a:ext cx="8520600" cy="572700"/>
+          </a:xfrm>
+          <a:prstGeom prst="rect">
+            <a:avLst/>
+          </a:prstGeom>
+        </p:spPr>
+        <p:txBody>
+          <a:bodyPr spcFirstLastPara="1" wrap="square" lIns="91425" tIns="91425" rIns="91425" bIns="91425" anchor="t" anchorCtr="0">
+            <a:normAutofit fontScale="90000"/>
+          </a:bodyPr>
+          <a:lstStyle/>
+          <a:p>
+            <a:pPr marL="0" lvl="0" indent="0" algn="l" rtl="0">
+              <a:spcBef>
+                <a:spcPts val="0"/>
+              </a:spcBef>
+              <a:spcAft>
+                <a:spcPts val="0"/>
+              </a:spcAft>
+              <a:buClr>
+                <a:schemeClr val="dk1"/>
+              </a:buClr>
+              <a:buSzPct val="39000"/>
+              <a:buFont typeface="Arial" panose="020B0604020202020204"/>
+              <a:buNone/>
+            </a:pPr>
+            <a:r>
+              <a:rPr lang="en-GB"/>
+              <a:t>NLP &amp; AI</a:t>
+            </a:r>
+            <a:endParaRPr lang="en-GB"/>
+          </a:p>
+          <a:p>
+            <a:pPr marL="0" lvl="0" indent="0" algn="l" rtl="0">
+              <a:spcBef>
+                <a:spcPts val="0"/>
+              </a:spcBef>
+              <a:spcAft>
+                <a:spcPts val="0"/>
+              </a:spcAft>
+              <a:buClr>
+                <a:schemeClr val="dk1"/>
+              </a:buClr>
+              <a:buSzPct val="39000"/>
+              <a:buFont typeface="Arial" panose="020B0604020202020204"/>
+              <a:buNone/>
+            </a:pPr>
+          </a:p>
+          <a:p>
+            <a:pPr marL="0" lvl="0" indent="0" algn="l" rtl="0">
+              <a:spcBef>
+                <a:spcPts val="0"/>
+              </a:spcBef>
+              <a:spcAft>
+                <a:spcPts val="0"/>
+              </a:spcAft>
+              <a:buNone/>
+            </a:pPr>
+          </a:p>
+        </p:txBody>
+      </p:sp>
+      <p:sp>
+        <p:nvSpPr>
+          <p:cNvPr id="99" name="Google Shape;99;p20"/>
+          <p:cNvSpPr txBox="1"/>
+          <p:nvPr>
+            <p:ph type="body" idx="1"/>
+          </p:nvPr>
+        </p:nvSpPr>
+        <p:spPr>
+          <a:xfrm>
+            <a:off x="311700" y="1152475"/>
+            <a:ext cx="8520600" cy="3416400"/>
+          </a:xfrm>
+          <a:prstGeom prst="rect">
+            <a:avLst/>
+          </a:prstGeom>
+        </p:spPr>
+        <p:txBody>
+          <a:bodyPr spcFirstLastPara="1" wrap="square" lIns="91425" tIns="91425" rIns="91425" bIns="91425" anchor="t" anchorCtr="0">
+            <a:noAutofit/>
+          </a:bodyPr>
+          <a:lstStyle/>
+          <a:p>
+            <a:pPr marL="457200" lvl="0" indent="-357505" algn="l" rtl="0">
+              <a:lnSpc>
+                <a:spcPct val="95000"/>
+              </a:lnSpc>
+              <a:spcBef>
+                <a:spcPts val="0"/>
+              </a:spcBef>
+              <a:spcAft>
+                <a:spcPts val="0"/>
+              </a:spcAft>
+              <a:buClr>
+                <a:schemeClr val="dk1"/>
+              </a:buClr>
+              <a:buSzPts val="2030"/>
+              <a:buChar char="●"/>
+            </a:pPr>
+            <a:r>
+              <a:rPr lang="en-GB" sz="2030" b="1">
+                <a:solidFill>
+                  <a:schemeClr val="dk1"/>
+                </a:solidFill>
+              </a:rPr>
+              <a:t>Computer Science </a:t>
+            </a:r>
+            <a:endParaRPr sz="2030" b="1">
+              <a:solidFill>
+                <a:schemeClr val="dk1"/>
+              </a:solidFill>
+            </a:endParaRPr>
+          </a:p>
+          <a:p>
+            <a:pPr marL="914400" lvl="1" indent="-335915" algn="l" rtl="0">
+              <a:lnSpc>
+                <a:spcPct val="95000"/>
+              </a:lnSpc>
+              <a:spcBef>
+                <a:spcPts val="0"/>
+              </a:spcBef>
+              <a:spcAft>
+                <a:spcPts val="0"/>
+              </a:spcAft>
+              <a:buClr>
+                <a:schemeClr val="dk1"/>
+              </a:buClr>
+              <a:buSzPts val="1690"/>
+              <a:buChar char="○"/>
+            </a:pPr>
+            <a:r>
+              <a:rPr lang="en-GB" sz="1690">
+                <a:solidFill>
+                  <a:schemeClr val="dk1"/>
+                </a:solidFill>
+              </a:rPr>
+              <a:t>Programming </a:t>
+            </a:r>
+            <a:endParaRPr sz="1690">
+              <a:solidFill>
+                <a:schemeClr val="dk1"/>
+              </a:solidFill>
+            </a:endParaRPr>
+          </a:p>
+          <a:p>
+            <a:pPr marL="914400" lvl="1" indent="-335915" algn="l" rtl="0">
+              <a:lnSpc>
+                <a:spcPct val="95000"/>
+              </a:lnSpc>
+              <a:spcBef>
+                <a:spcPts val="0"/>
+              </a:spcBef>
+              <a:spcAft>
+                <a:spcPts val="0"/>
+              </a:spcAft>
+              <a:buClr>
+                <a:schemeClr val="dk1"/>
+              </a:buClr>
+              <a:buSzPts val="1690"/>
+              <a:buChar char="○"/>
+            </a:pPr>
+            <a:r>
+              <a:rPr lang="en-GB" sz="1690">
+                <a:solidFill>
+                  <a:schemeClr val="dk1"/>
+                </a:solidFill>
+              </a:rPr>
+              <a:t>Operating Systems </a:t>
+            </a:r>
+            <a:endParaRPr sz="1690">
+              <a:solidFill>
+                <a:schemeClr val="dk1"/>
+              </a:solidFill>
+            </a:endParaRPr>
+          </a:p>
+          <a:p>
+            <a:pPr marL="914400" lvl="1" indent="-335915" algn="l" rtl="0">
+              <a:lnSpc>
+                <a:spcPct val="95000"/>
+              </a:lnSpc>
+              <a:spcBef>
+                <a:spcPts val="0"/>
+              </a:spcBef>
+              <a:spcAft>
+                <a:spcPts val="0"/>
+              </a:spcAft>
+              <a:buClr>
+                <a:schemeClr val="dk1"/>
+              </a:buClr>
+              <a:buSzPts val="1690"/>
+              <a:buChar char="○"/>
+            </a:pPr>
+            <a:r>
+              <a:rPr lang="en-GB" sz="1690">
+                <a:solidFill>
+                  <a:schemeClr val="dk1"/>
+                </a:solidFill>
+              </a:rPr>
+              <a:t>Databases</a:t>
+            </a:r>
+            <a:endParaRPr sz="1690">
+              <a:solidFill>
+                <a:schemeClr val="dk1"/>
+              </a:solidFill>
+            </a:endParaRPr>
+          </a:p>
+          <a:p>
+            <a:pPr marL="914400" lvl="1" indent="-335915" algn="l" rtl="0">
+              <a:lnSpc>
+                <a:spcPct val="95000"/>
+              </a:lnSpc>
+              <a:spcBef>
+                <a:spcPts val="0"/>
+              </a:spcBef>
+              <a:spcAft>
+                <a:spcPts val="0"/>
+              </a:spcAft>
+              <a:buClr>
+                <a:schemeClr val="dk1"/>
+              </a:buClr>
+              <a:buSzPts val="1690"/>
+              <a:buChar char="○"/>
+            </a:pPr>
+            <a:r>
+              <a:rPr lang="en-GB" sz="1690">
+                <a:solidFill>
+                  <a:schemeClr val="dk1"/>
+                </a:solidFill>
+              </a:rPr>
+              <a:t>… </a:t>
+            </a:r>
+            <a:endParaRPr sz="1690">
+              <a:solidFill>
+                <a:schemeClr val="dk1"/>
+              </a:solidFill>
+            </a:endParaRPr>
+          </a:p>
+          <a:p>
+            <a:pPr marL="914400" lvl="1" indent="-335915" algn="l" rtl="0">
+              <a:lnSpc>
+                <a:spcPct val="95000"/>
+              </a:lnSpc>
+              <a:spcBef>
+                <a:spcPts val="0"/>
+              </a:spcBef>
+              <a:spcAft>
+                <a:spcPts val="0"/>
+              </a:spcAft>
+              <a:buClr>
+                <a:schemeClr val="dk1"/>
+              </a:buClr>
+              <a:buSzPts val="1690"/>
+              <a:buChar char="○"/>
+            </a:pPr>
+            <a:r>
+              <a:rPr lang="en-GB" sz="1690" b="1">
+                <a:solidFill>
+                  <a:schemeClr val="dk1"/>
+                </a:solidFill>
+              </a:rPr>
+              <a:t>Artificial Intelligence </a:t>
+            </a:r>
+            <a:endParaRPr sz="1690" b="1">
+              <a:solidFill>
+                <a:schemeClr val="dk1"/>
+              </a:solidFill>
+            </a:endParaRPr>
+          </a:p>
+          <a:p>
+            <a:pPr marL="1371600" lvl="2" indent="-335915" algn="l" rtl="0">
+              <a:lnSpc>
+                <a:spcPct val="95000"/>
+              </a:lnSpc>
+              <a:spcBef>
+                <a:spcPts val="0"/>
+              </a:spcBef>
+              <a:spcAft>
+                <a:spcPts val="0"/>
+              </a:spcAft>
+              <a:buClr>
+                <a:schemeClr val="dk1"/>
+              </a:buClr>
+              <a:buSzPts val="1690"/>
+              <a:buChar char="■"/>
+            </a:pPr>
+            <a:r>
+              <a:rPr lang="en-GB" sz="1690">
+                <a:solidFill>
+                  <a:schemeClr val="dk1"/>
+                </a:solidFill>
+              </a:rPr>
+              <a:t>Problem Solving </a:t>
+            </a:r>
+            <a:endParaRPr sz="1690">
+              <a:solidFill>
+                <a:schemeClr val="dk1"/>
+              </a:solidFill>
+            </a:endParaRPr>
+          </a:p>
+          <a:p>
+            <a:pPr marL="1371600" lvl="2" indent="-335915" algn="l" rtl="0">
+              <a:lnSpc>
+                <a:spcPct val="95000"/>
+              </a:lnSpc>
+              <a:spcBef>
+                <a:spcPts val="0"/>
+              </a:spcBef>
+              <a:spcAft>
+                <a:spcPts val="0"/>
+              </a:spcAft>
+              <a:buClr>
+                <a:schemeClr val="dk1"/>
+              </a:buClr>
+              <a:buSzPts val="1690"/>
+              <a:buChar char="■"/>
+            </a:pPr>
+            <a:r>
+              <a:rPr lang="en-GB" sz="1690">
+                <a:solidFill>
+                  <a:schemeClr val="dk1"/>
+                </a:solidFill>
+              </a:rPr>
+              <a:t>Optimization </a:t>
+            </a:r>
+            <a:endParaRPr sz="1690">
+              <a:solidFill>
+                <a:schemeClr val="dk1"/>
+              </a:solidFill>
+            </a:endParaRPr>
+          </a:p>
+          <a:p>
+            <a:pPr marL="1371600" lvl="2" indent="-335915" algn="l" rtl="0">
+              <a:lnSpc>
+                <a:spcPct val="95000"/>
+              </a:lnSpc>
+              <a:spcBef>
+                <a:spcPts val="0"/>
+              </a:spcBef>
+              <a:spcAft>
+                <a:spcPts val="0"/>
+              </a:spcAft>
+              <a:buClr>
+                <a:schemeClr val="dk1"/>
+              </a:buClr>
+              <a:buSzPts val="1690"/>
+              <a:buChar char="■"/>
+            </a:pPr>
+            <a:r>
+              <a:rPr lang="en-GB" sz="1690">
+                <a:solidFill>
+                  <a:schemeClr val="dk1"/>
+                </a:solidFill>
+              </a:rPr>
+              <a:t>Robotics </a:t>
+            </a:r>
+            <a:endParaRPr sz="1690">
+              <a:solidFill>
+                <a:schemeClr val="dk1"/>
+              </a:solidFill>
+            </a:endParaRPr>
+          </a:p>
+          <a:p>
+            <a:pPr marL="1371600" lvl="2" indent="-335915" algn="l" rtl="0">
+              <a:lnSpc>
+                <a:spcPct val="95000"/>
+              </a:lnSpc>
+              <a:spcBef>
+                <a:spcPts val="0"/>
+              </a:spcBef>
+              <a:spcAft>
+                <a:spcPts val="0"/>
+              </a:spcAft>
+              <a:buClr>
+                <a:schemeClr val="dk1"/>
+              </a:buClr>
+              <a:buSzPts val="1690"/>
+              <a:buChar char="■"/>
+            </a:pPr>
+            <a:r>
+              <a:rPr lang="en-GB" sz="1690">
+                <a:solidFill>
+                  <a:schemeClr val="dk1"/>
+                </a:solidFill>
+              </a:rPr>
+              <a:t>Machine Learning </a:t>
+            </a:r>
+            <a:endParaRPr sz="1690">
+              <a:solidFill>
+                <a:schemeClr val="dk1"/>
+              </a:solidFill>
+            </a:endParaRPr>
+          </a:p>
+          <a:p>
+            <a:pPr marL="1371600" lvl="2" indent="-335915" algn="l" rtl="0">
+              <a:lnSpc>
+                <a:spcPct val="95000"/>
+              </a:lnSpc>
+              <a:spcBef>
+                <a:spcPts val="0"/>
+              </a:spcBef>
+              <a:spcAft>
+                <a:spcPts val="0"/>
+              </a:spcAft>
+              <a:buClr>
+                <a:schemeClr val="dk1"/>
+              </a:buClr>
+              <a:buSzPts val="1690"/>
+              <a:buChar char="■"/>
+            </a:pPr>
+            <a:r>
+              <a:rPr lang="en-GB" sz="1690">
+                <a:solidFill>
+                  <a:schemeClr val="dk1"/>
+                </a:solidFill>
+              </a:rPr>
+              <a:t>Computer Vision </a:t>
+            </a:r>
+            <a:endParaRPr sz="1690">
+              <a:solidFill>
+                <a:schemeClr val="dk1"/>
+              </a:solidFill>
+            </a:endParaRPr>
+          </a:p>
+          <a:p>
+            <a:pPr marL="1371600" lvl="2" indent="-335915" algn="l" rtl="0">
+              <a:lnSpc>
+                <a:spcPct val="95000"/>
+              </a:lnSpc>
+              <a:spcBef>
+                <a:spcPts val="0"/>
+              </a:spcBef>
+              <a:spcAft>
+                <a:spcPts val="0"/>
+              </a:spcAft>
+              <a:buClr>
+                <a:schemeClr val="dk1"/>
+              </a:buClr>
+              <a:buSzPts val="1690"/>
+              <a:buChar char="■"/>
+            </a:pPr>
+            <a:r>
+              <a:rPr lang="en-GB" sz="1690" b="1">
+                <a:solidFill>
+                  <a:schemeClr val="dk1"/>
+                </a:solidFill>
+              </a:rPr>
+              <a:t>Natural Language Processing</a:t>
+            </a:r>
+            <a:endParaRPr sz="1690" b="1">
+              <a:solidFill>
+                <a:schemeClr val="dk1"/>
+              </a:solidFill>
+            </a:endParaRPr>
+          </a:p>
+          <a:p>
+            <a:pPr marL="1371600" lvl="2" indent="-335915" algn="l" rtl="0">
+              <a:lnSpc>
+                <a:spcPct val="95000"/>
+              </a:lnSpc>
+              <a:spcBef>
+                <a:spcPts val="0"/>
+              </a:spcBef>
+              <a:spcAft>
+                <a:spcPts val="0"/>
+              </a:spcAft>
+              <a:buClr>
+                <a:schemeClr val="dk1"/>
+              </a:buClr>
+              <a:buSzPts val="1690"/>
+              <a:buChar char="■"/>
+            </a:pPr>
+            <a:r>
+              <a:rPr lang="en-GB" sz="1690">
+                <a:solidFill>
+                  <a:schemeClr val="dk1"/>
+                </a:solidFill>
+              </a:rPr>
+              <a:t>….. </a:t>
+            </a:r>
+            <a:endParaRPr sz="1690">
+              <a:solidFill>
+                <a:schemeClr val="dk1"/>
+              </a:solidFill>
+            </a:endParaRPr>
+          </a:p>
+          <a:p>
+            <a:pPr marL="0" lvl="0" indent="0" algn="l" rtl="0">
+              <a:lnSpc>
+                <a:spcPct val="95000"/>
+              </a:lnSpc>
+              <a:spcBef>
+                <a:spcPts val="1200"/>
+              </a:spcBef>
+              <a:spcAft>
+                <a:spcPts val="0"/>
+              </a:spcAft>
+              <a:buClr>
+                <a:schemeClr val="dk1"/>
+              </a:buClr>
+              <a:buSzPts val="935"/>
+              <a:buFont typeface="Arial" panose="020B0604020202020204"/>
+              <a:buNone/>
+            </a:pPr>
+            <a:endParaRPr sz="2030">
+              <a:solidFill>
+                <a:schemeClr val="dk1"/>
+              </a:solidFill>
+            </a:endParaRPr>
+          </a:p>
+          <a:p>
+            <a:pPr marL="0" lvl="0" indent="0" algn="l" rtl="0">
+              <a:lnSpc>
+                <a:spcPct val="95000"/>
+              </a:lnSpc>
+              <a:spcBef>
+                <a:spcPts val="1200"/>
+              </a:spcBef>
+              <a:spcAft>
+                <a:spcPts val="1200"/>
+              </a:spcAft>
+              <a:buSzPts val="935"/>
+              <a:buNone/>
+            </a:pPr>
+            <a:endParaRPr sz="2030">
+              <a:solidFill>
+                <a:schemeClr val="dk1"/>
+              </a:solidFill>
+            </a:endParaRPr>
+          </a:p>
+        </p:txBody>
+      </p:sp>
+      <p:pic>
+        <p:nvPicPr>
+          <p:cNvPr id="100" name="Google Shape;100;p20"/>
+          <p:cNvPicPr preferRelativeResize="0"/>
+          <p:nvPr/>
+        </p:nvPicPr>
+        <p:blipFill>
+          <a:blip r:embed="rId1"/>
+          <a:stretch>
+            <a:fillRect/>
+          </a:stretch>
+        </p:blipFill>
+        <p:spPr>
+          <a:xfrm>
+            <a:off x="3113725" y="139000"/>
+            <a:ext cx="6030274" cy="4228175"/>
+          </a:xfrm>
+          <a:prstGeom prst="rect">
+            <a:avLst/>
+          </a:prstGeom>
+          <a:noFill/>
+          <a:ln>
+            <a:noFill/>
+          </a:ln>
+        </p:spPr>
+      </p:pic>
+    </p:spTree>
+  </p:cSld>
+  <p:clrMapOvr>
+    <a:masterClrMapping/>
+  </p:clrMapOvr>
+</p:sld>
+</file>
+
+<file path=ppt/slides/slide60.xml><?xml version="1.0" encoding="utf-8"?>
 <p:sld xmlns:a="http://schemas.openxmlformats.org/drawingml/2006/main" xmlns:r="http://schemas.openxmlformats.org/officeDocument/2006/relationships" xmlns:p="http://schemas.openxmlformats.org/presentationml/2006/main">
   <p:cSld>
     <p:spTree>
@@ -43894,7 +44878,7 @@
 </p:sld>
 </file>
 
-<file path=ppt/slides/slide59.xml><?xml version="1.0" encoding="utf-8"?>
+<file path=ppt/slides/slide61.xml><?xml version="1.0" encoding="utf-8"?>
 <p:sld xmlns:a="http://schemas.openxmlformats.org/drawingml/2006/main" xmlns:r="http://schemas.openxmlformats.org/officeDocument/2006/relationships" xmlns:p="http://schemas.openxmlformats.org/presentationml/2006/main">
   <p:cSld>
     <p:spTree>
@@ -44078,601 +45062,7 @@
 </p:sld>
 </file>
 
-<file path=ppt/slides/slide6.xml><?xml version="1.0" encoding="utf-8"?>
-<p:sld xmlns:a="http://schemas.openxmlformats.org/drawingml/2006/main" xmlns:r="http://schemas.openxmlformats.org/officeDocument/2006/relationships" xmlns:p="http://schemas.openxmlformats.org/presentationml/2006/main">
-  <p:cSld>
-    <p:spTree>
-      <p:nvGrpSpPr>
-        <p:cNvPr id="97" name="Shape 97"/>
-        <p:cNvGrpSpPr/>
-        <p:nvPr/>
-      </p:nvGrpSpPr>
-      <p:grpSpPr>
-        <a:xfrm>
-          <a:off x="0" y="0"/>
-          <a:ext cx="0" cy="0"/>
-          <a:chOff x="0" y="0"/>
-          <a:chExt cx="0" cy="0"/>
-        </a:xfrm>
-      </p:grpSpPr>
-      <p:sp>
-        <p:nvSpPr>
-          <p:cNvPr id="98" name="Google Shape;98;p20"/>
-          <p:cNvSpPr txBox="1"/>
-          <p:nvPr>
-            <p:ph type="title"/>
-          </p:nvPr>
-        </p:nvSpPr>
-        <p:spPr>
-          <a:xfrm>
-            <a:off x="311700" y="445025"/>
-            <a:ext cx="8520600" cy="572700"/>
-          </a:xfrm>
-          <a:prstGeom prst="rect">
-            <a:avLst/>
-          </a:prstGeom>
-        </p:spPr>
-        <p:txBody>
-          <a:bodyPr spcFirstLastPara="1" wrap="square" lIns="91425" tIns="91425" rIns="91425" bIns="91425" anchor="t" anchorCtr="0">
-            <a:normAutofit fontScale="90000"/>
-          </a:bodyPr>
-          <a:lstStyle/>
-          <a:p>
-            <a:pPr marL="0" lvl="0" indent="0" algn="l" rtl="0">
-              <a:spcBef>
-                <a:spcPts val="0"/>
-              </a:spcBef>
-              <a:spcAft>
-                <a:spcPts val="0"/>
-              </a:spcAft>
-              <a:buClr>
-                <a:schemeClr val="dk1"/>
-              </a:buClr>
-              <a:buSzPct val="39000"/>
-              <a:buFont typeface="Arial" panose="020B0604020202020204"/>
-              <a:buNone/>
-            </a:pPr>
-            <a:r>
-              <a:rPr lang="en-GB"/>
-              <a:t>NLP &amp; AI</a:t>
-            </a:r>
-            <a:endParaRPr lang="en-GB"/>
-          </a:p>
-          <a:p>
-            <a:pPr marL="0" lvl="0" indent="0" algn="l" rtl="0">
-              <a:spcBef>
-                <a:spcPts val="0"/>
-              </a:spcBef>
-              <a:spcAft>
-                <a:spcPts val="0"/>
-              </a:spcAft>
-              <a:buClr>
-                <a:schemeClr val="dk1"/>
-              </a:buClr>
-              <a:buSzPct val="39000"/>
-              <a:buFont typeface="Arial" panose="020B0604020202020204"/>
-              <a:buNone/>
-            </a:pPr>
-          </a:p>
-          <a:p>
-            <a:pPr marL="0" lvl="0" indent="0" algn="l" rtl="0">
-              <a:spcBef>
-                <a:spcPts val="0"/>
-              </a:spcBef>
-              <a:spcAft>
-                <a:spcPts val="0"/>
-              </a:spcAft>
-              <a:buNone/>
-            </a:pPr>
-          </a:p>
-        </p:txBody>
-      </p:sp>
-      <p:sp>
-        <p:nvSpPr>
-          <p:cNvPr id="99" name="Google Shape;99;p20"/>
-          <p:cNvSpPr txBox="1"/>
-          <p:nvPr>
-            <p:ph type="body" idx="1"/>
-          </p:nvPr>
-        </p:nvSpPr>
-        <p:spPr>
-          <a:xfrm>
-            <a:off x="311700" y="1152475"/>
-            <a:ext cx="8520600" cy="3416400"/>
-          </a:xfrm>
-          <a:prstGeom prst="rect">
-            <a:avLst/>
-          </a:prstGeom>
-        </p:spPr>
-        <p:txBody>
-          <a:bodyPr spcFirstLastPara="1" wrap="square" lIns="91425" tIns="91425" rIns="91425" bIns="91425" anchor="t" anchorCtr="0">
-            <a:noAutofit/>
-          </a:bodyPr>
-          <a:lstStyle/>
-          <a:p>
-            <a:pPr marL="457200" lvl="0" indent="-357505" algn="l" rtl="0">
-              <a:lnSpc>
-                <a:spcPct val="95000"/>
-              </a:lnSpc>
-              <a:spcBef>
-                <a:spcPts val="0"/>
-              </a:spcBef>
-              <a:spcAft>
-                <a:spcPts val="0"/>
-              </a:spcAft>
-              <a:buClr>
-                <a:schemeClr val="dk1"/>
-              </a:buClr>
-              <a:buSzPts val="2030"/>
-              <a:buChar char="●"/>
-            </a:pPr>
-            <a:r>
-              <a:rPr lang="en-GB" sz="2030" b="1">
-                <a:solidFill>
-                  <a:schemeClr val="dk1"/>
-                </a:solidFill>
-              </a:rPr>
-              <a:t>Computer Science </a:t>
-            </a:r>
-            <a:endParaRPr sz="2030" b="1">
-              <a:solidFill>
-                <a:schemeClr val="dk1"/>
-              </a:solidFill>
-            </a:endParaRPr>
-          </a:p>
-          <a:p>
-            <a:pPr marL="914400" lvl="1" indent="-335915" algn="l" rtl="0">
-              <a:lnSpc>
-                <a:spcPct val="95000"/>
-              </a:lnSpc>
-              <a:spcBef>
-                <a:spcPts val="0"/>
-              </a:spcBef>
-              <a:spcAft>
-                <a:spcPts val="0"/>
-              </a:spcAft>
-              <a:buClr>
-                <a:schemeClr val="dk1"/>
-              </a:buClr>
-              <a:buSzPts val="1690"/>
-              <a:buChar char="○"/>
-            </a:pPr>
-            <a:r>
-              <a:rPr lang="en-GB" sz="1690">
-                <a:solidFill>
-                  <a:schemeClr val="dk1"/>
-                </a:solidFill>
-              </a:rPr>
-              <a:t>Programming </a:t>
-            </a:r>
-            <a:endParaRPr sz="1690">
-              <a:solidFill>
-                <a:schemeClr val="dk1"/>
-              </a:solidFill>
-            </a:endParaRPr>
-          </a:p>
-          <a:p>
-            <a:pPr marL="914400" lvl="1" indent="-335915" algn="l" rtl="0">
-              <a:lnSpc>
-                <a:spcPct val="95000"/>
-              </a:lnSpc>
-              <a:spcBef>
-                <a:spcPts val="0"/>
-              </a:spcBef>
-              <a:spcAft>
-                <a:spcPts val="0"/>
-              </a:spcAft>
-              <a:buClr>
-                <a:schemeClr val="dk1"/>
-              </a:buClr>
-              <a:buSzPts val="1690"/>
-              <a:buChar char="○"/>
-            </a:pPr>
-            <a:r>
-              <a:rPr lang="en-GB" sz="1690">
-                <a:solidFill>
-                  <a:schemeClr val="dk1"/>
-                </a:solidFill>
-              </a:rPr>
-              <a:t>Operating Systems </a:t>
-            </a:r>
-            <a:endParaRPr sz="1690">
-              <a:solidFill>
-                <a:schemeClr val="dk1"/>
-              </a:solidFill>
-            </a:endParaRPr>
-          </a:p>
-          <a:p>
-            <a:pPr marL="914400" lvl="1" indent="-335915" algn="l" rtl="0">
-              <a:lnSpc>
-                <a:spcPct val="95000"/>
-              </a:lnSpc>
-              <a:spcBef>
-                <a:spcPts val="0"/>
-              </a:spcBef>
-              <a:spcAft>
-                <a:spcPts val="0"/>
-              </a:spcAft>
-              <a:buClr>
-                <a:schemeClr val="dk1"/>
-              </a:buClr>
-              <a:buSzPts val="1690"/>
-              <a:buChar char="○"/>
-            </a:pPr>
-            <a:r>
-              <a:rPr lang="en-GB" sz="1690">
-                <a:solidFill>
-                  <a:schemeClr val="dk1"/>
-                </a:solidFill>
-              </a:rPr>
-              <a:t>Databases</a:t>
-            </a:r>
-            <a:endParaRPr sz="1690">
-              <a:solidFill>
-                <a:schemeClr val="dk1"/>
-              </a:solidFill>
-            </a:endParaRPr>
-          </a:p>
-          <a:p>
-            <a:pPr marL="914400" lvl="1" indent="-335915" algn="l" rtl="0">
-              <a:lnSpc>
-                <a:spcPct val="95000"/>
-              </a:lnSpc>
-              <a:spcBef>
-                <a:spcPts val="0"/>
-              </a:spcBef>
-              <a:spcAft>
-                <a:spcPts val="0"/>
-              </a:spcAft>
-              <a:buClr>
-                <a:schemeClr val="dk1"/>
-              </a:buClr>
-              <a:buSzPts val="1690"/>
-              <a:buChar char="○"/>
-            </a:pPr>
-            <a:r>
-              <a:rPr lang="en-GB" sz="1690">
-                <a:solidFill>
-                  <a:schemeClr val="dk1"/>
-                </a:solidFill>
-              </a:rPr>
-              <a:t>… </a:t>
-            </a:r>
-            <a:endParaRPr sz="1690">
-              <a:solidFill>
-                <a:schemeClr val="dk1"/>
-              </a:solidFill>
-            </a:endParaRPr>
-          </a:p>
-          <a:p>
-            <a:pPr marL="914400" lvl="1" indent="-335915" algn="l" rtl="0">
-              <a:lnSpc>
-                <a:spcPct val="95000"/>
-              </a:lnSpc>
-              <a:spcBef>
-                <a:spcPts val="0"/>
-              </a:spcBef>
-              <a:spcAft>
-                <a:spcPts val="0"/>
-              </a:spcAft>
-              <a:buClr>
-                <a:schemeClr val="dk1"/>
-              </a:buClr>
-              <a:buSzPts val="1690"/>
-              <a:buChar char="○"/>
-            </a:pPr>
-            <a:r>
-              <a:rPr lang="en-GB" sz="1690" b="1">
-                <a:solidFill>
-                  <a:schemeClr val="dk1"/>
-                </a:solidFill>
-              </a:rPr>
-              <a:t>Artificial Intelligence </a:t>
-            </a:r>
-            <a:endParaRPr sz="1690" b="1">
-              <a:solidFill>
-                <a:schemeClr val="dk1"/>
-              </a:solidFill>
-            </a:endParaRPr>
-          </a:p>
-          <a:p>
-            <a:pPr marL="1371600" lvl="2" indent="-335915" algn="l" rtl="0">
-              <a:lnSpc>
-                <a:spcPct val="95000"/>
-              </a:lnSpc>
-              <a:spcBef>
-                <a:spcPts val="0"/>
-              </a:spcBef>
-              <a:spcAft>
-                <a:spcPts val="0"/>
-              </a:spcAft>
-              <a:buClr>
-                <a:schemeClr val="dk1"/>
-              </a:buClr>
-              <a:buSzPts val="1690"/>
-              <a:buChar char="■"/>
-            </a:pPr>
-            <a:r>
-              <a:rPr lang="en-GB" sz="1690">
-                <a:solidFill>
-                  <a:schemeClr val="dk1"/>
-                </a:solidFill>
-              </a:rPr>
-              <a:t>Problem Solving </a:t>
-            </a:r>
-            <a:endParaRPr sz="1690">
-              <a:solidFill>
-                <a:schemeClr val="dk1"/>
-              </a:solidFill>
-            </a:endParaRPr>
-          </a:p>
-          <a:p>
-            <a:pPr marL="1371600" lvl="2" indent="-335915" algn="l" rtl="0">
-              <a:lnSpc>
-                <a:spcPct val="95000"/>
-              </a:lnSpc>
-              <a:spcBef>
-                <a:spcPts val="0"/>
-              </a:spcBef>
-              <a:spcAft>
-                <a:spcPts val="0"/>
-              </a:spcAft>
-              <a:buClr>
-                <a:schemeClr val="dk1"/>
-              </a:buClr>
-              <a:buSzPts val="1690"/>
-              <a:buChar char="■"/>
-            </a:pPr>
-            <a:r>
-              <a:rPr lang="en-GB" sz="1690">
-                <a:solidFill>
-                  <a:schemeClr val="dk1"/>
-                </a:solidFill>
-              </a:rPr>
-              <a:t>Optimization </a:t>
-            </a:r>
-            <a:endParaRPr sz="1690">
-              <a:solidFill>
-                <a:schemeClr val="dk1"/>
-              </a:solidFill>
-            </a:endParaRPr>
-          </a:p>
-          <a:p>
-            <a:pPr marL="1371600" lvl="2" indent="-335915" algn="l" rtl="0">
-              <a:lnSpc>
-                <a:spcPct val="95000"/>
-              </a:lnSpc>
-              <a:spcBef>
-                <a:spcPts val="0"/>
-              </a:spcBef>
-              <a:spcAft>
-                <a:spcPts val="0"/>
-              </a:spcAft>
-              <a:buClr>
-                <a:schemeClr val="dk1"/>
-              </a:buClr>
-              <a:buSzPts val="1690"/>
-              <a:buChar char="■"/>
-            </a:pPr>
-            <a:r>
-              <a:rPr lang="en-GB" sz="1690">
-                <a:solidFill>
-                  <a:schemeClr val="dk1"/>
-                </a:solidFill>
-              </a:rPr>
-              <a:t>Robotics </a:t>
-            </a:r>
-            <a:endParaRPr sz="1690">
-              <a:solidFill>
-                <a:schemeClr val="dk1"/>
-              </a:solidFill>
-            </a:endParaRPr>
-          </a:p>
-          <a:p>
-            <a:pPr marL="1371600" lvl="2" indent="-335915" algn="l" rtl="0">
-              <a:lnSpc>
-                <a:spcPct val="95000"/>
-              </a:lnSpc>
-              <a:spcBef>
-                <a:spcPts val="0"/>
-              </a:spcBef>
-              <a:spcAft>
-                <a:spcPts val="0"/>
-              </a:spcAft>
-              <a:buClr>
-                <a:schemeClr val="dk1"/>
-              </a:buClr>
-              <a:buSzPts val="1690"/>
-              <a:buChar char="■"/>
-            </a:pPr>
-            <a:r>
-              <a:rPr lang="en-GB" sz="1690">
-                <a:solidFill>
-                  <a:schemeClr val="dk1"/>
-                </a:solidFill>
-              </a:rPr>
-              <a:t>Machine Learning </a:t>
-            </a:r>
-            <a:endParaRPr sz="1690">
-              <a:solidFill>
-                <a:schemeClr val="dk1"/>
-              </a:solidFill>
-            </a:endParaRPr>
-          </a:p>
-          <a:p>
-            <a:pPr marL="1371600" lvl="2" indent="-335915" algn="l" rtl="0">
-              <a:lnSpc>
-                <a:spcPct val="95000"/>
-              </a:lnSpc>
-              <a:spcBef>
-                <a:spcPts val="0"/>
-              </a:spcBef>
-              <a:spcAft>
-                <a:spcPts val="0"/>
-              </a:spcAft>
-              <a:buClr>
-                <a:schemeClr val="dk1"/>
-              </a:buClr>
-              <a:buSzPts val="1690"/>
-              <a:buChar char="■"/>
-            </a:pPr>
-            <a:r>
-              <a:rPr lang="en-GB" sz="1690">
-                <a:solidFill>
-                  <a:schemeClr val="dk1"/>
-                </a:solidFill>
-              </a:rPr>
-              <a:t>Computer Vision </a:t>
-            </a:r>
-            <a:endParaRPr sz="1690">
-              <a:solidFill>
-                <a:schemeClr val="dk1"/>
-              </a:solidFill>
-            </a:endParaRPr>
-          </a:p>
-          <a:p>
-            <a:pPr marL="1371600" lvl="2" indent="-335915" algn="l" rtl="0">
-              <a:lnSpc>
-                <a:spcPct val="95000"/>
-              </a:lnSpc>
-              <a:spcBef>
-                <a:spcPts val="0"/>
-              </a:spcBef>
-              <a:spcAft>
-                <a:spcPts val="0"/>
-              </a:spcAft>
-              <a:buClr>
-                <a:schemeClr val="dk1"/>
-              </a:buClr>
-              <a:buSzPts val="1690"/>
-              <a:buChar char="■"/>
-            </a:pPr>
-            <a:r>
-              <a:rPr lang="en-GB" sz="1690" b="1">
-                <a:solidFill>
-                  <a:schemeClr val="dk1"/>
-                </a:solidFill>
-              </a:rPr>
-              <a:t>Natural Language Processing</a:t>
-            </a:r>
-            <a:endParaRPr sz="1690" b="1">
-              <a:solidFill>
-                <a:schemeClr val="dk1"/>
-              </a:solidFill>
-            </a:endParaRPr>
-          </a:p>
-          <a:p>
-            <a:pPr marL="1371600" lvl="2" indent="-335915" algn="l" rtl="0">
-              <a:lnSpc>
-                <a:spcPct val="95000"/>
-              </a:lnSpc>
-              <a:spcBef>
-                <a:spcPts val="0"/>
-              </a:spcBef>
-              <a:spcAft>
-                <a:spcPts val="0"/>
-              </a:spcAft>
-              <a:buClr>
-                <a:schemeClr val="dk1"/>
-              </a:buClr>
-              <a:buSzPts val="1690"/>
-              <a:buChar char="■"/>
-            </a:pPr>
-            <a:r>
-              <a:rPr lang="en-GB" sz="1690">
-                <a:solidFill>
-                  <a:schemeClr val="dk1"/>
-                </a:solidFill>
-              </a:rPr>
-              <a:t>….. </a:t>
-            </a:r>
-            <a:endParaRPr sz="1690">
-              <a:solidFill>
-                <a:schemeClr val="dk1"/>
-              </a:solidFill>
-            </a:endParaRPr>
-          </a:p>
-          <a:p>
-            <a:pPr marL="0" lvl="0" indent="0" algn="l" rtl="0">
-              <a:lnSpc>
-                <a:spcPct val="95000"/>
-              </a:lnSpc>
-              <a:spcBef>
-                <a:spcPts val="1200"/>
-              </a:spcBef>
-              <a:spcAft>
-                <a:spcPts val="0"/>
-              </a:spcAft>
-              <a:buClr>
-                <a:schemeClr val="dk1"/>
-              </a:buClr>
-              <a:buSzPts val="935"/>
-              <a:buFont typeface="Arial" panose="020B0604020202020204"/>
-              <a:buNone/>
-            </a:pPr>
-            <a:endParaRPr sz="2030">
-              <a:solidFill>
-                <a:schemeClr val="dk1"/>
-              </a:solidFill>
-            </a:endParaRPr>
-          </a:p>
-          <a:p>
-            <a:pPr marL="0" lvl="0" indent="0" algn="l" rtl="0">
-              <a:lnSpc>
-                <a:spcPct val="95000"/>
-              </a:lnSpc>
-              <a:spcBef>
-                <a:spcPts val="1200"/>
-              </a:spcBef>
-              <a:spcAft>
-                <a:spcPts val="1200"/>
-              </a:spcAft>
-              <a:buSzPts val="935"/>
-              <a:buNone/>
-            </a:pPr>
-            <a:endParaRPr sz="2030">
-              <a:solidFill>
-                <a:schemeClr val="dk1"/>
-              </a:solidFill>
-            </a:endParaRPr>
-          </a:p>
-        </p:txBody>
-      </p:sp>
-      <p:pic>
-        <p:nvPicPr>
-          <p:cNvPr id="100" name="Google Shape;100;p20"/>
-          <p:cNvPicPr preferRelativeResize="0"/>
-          <p:nvPr/>
-        </p:nvPicPr>
-        <p:blipFill>
-          <a:blip r:embed="rId1"/>
-          <a:stretch>
-            <a:fillRect/>
-          </a:stretch>
-        </p:blipFill>
-        <p:spPr>
-          <a:xfrm>
-            <a:off x="3113725" y="139000"/>
-            <a:ext cx="6030274" cy="4228175"/>
-          </a:xfrm>
-          <a:prstGeom prst="rect">
-            <a:avLst/>
-          </a:prstGeom>
-          <a:noFill/>
-          <a:ln>
-            <a:noFill/>
-          </a:ln>
-        </p:spPr>
-      </p:pic>
-    </p:spTree>
-  </p:cSld>
-  <p:clrMapOvr>
-    <a:masterClrMapping/>
-  </p:clrMapOvr>
-</p:sld>
-</file>
-
-<file path=ppt/slides/slide60.xml><?xml version="1.0" encoding="utf-8"?>
+<file path=ppt/slides/slide62.xml><?xml version="1.0" encoding="utf-8"?>
 <p:sld xmlns:a="http://schemas.openxmlformats.org/drawingml/2006/main" xmlns:r="http://schemas.openxmlformats.org/officeDocument/2006/relationships" xmlns:p="http://schemas.openxmlformats.org/presentationml/2006/main">
   <p:cSld>
     <p:spTree>
@@ -46760,7 +47150,7 @@
 </p:sld>
 </file>
 
-<file path=ppt/slides/slide61.xml><?xml version="1.0" encoding="utf-8"?>
+<file path=ppt/slides/slide63.xml><?xml version="1.0" encoding="utf-8"?>
 <p:sld xmlns:a="http://schemas.openxmlformats.org/drawingml/2006/main" xmlns:r="http://schemas.openxmlformats.org/officeDocument/2006/relationships" xmlns:p="http://schemas.openxmlformats.org/presentationml/2006/main">
   <p:cSld>
     <p:spTree>
@@ -47094,7 +47484,7 @@
 </p:sld>
 </file>
 
-<file path=ppt/slides/slide62.xml><?xml version="1.0" encoding="utf-8"?>
+<file path=ppt/slides/slide64.xml><?xml version="1.0" encoding="utf-8"?>
 <p:sld xmlns:a="http://schemas.openxmlformats.org/drawingml/2006/main" xmlns:r="http://schemas.openxmlformats.org/officeDocument/2006/relationships" xmlns:p="http://schemas.openxmlformats.org/presentationml/2006/main">
   <p:cSld>
     <p:spTree>
@@ -47294,7 +47684,7 @@
 </p:sld>
 </file>
 
-<file path=ppt/slides/slide63.xml><?xml version="1.0" encoding="utf-8"?>
+<file path=ppt/slides/slide65.xml><?xml version="1.0" encoding="utf-8"?>
 <p:sld xmlns:a="http://schemas.openxmlformats.org/drawingml/2006/main" xmlns:r="http://schemas.openxmlformats.org/officeDocument/2006/relationships" xmlns:p="http://schemas.openxmlformats.org/presentationml/2006/main">
   <p:cSld>
     <p:spTree>
@@ -47807,7 +48197,7 @@
 </p:sld>
 </file>
 
-<file path=ppt/slides/slide64.xml><?xml version="1.0" encoding="utf-8"?>
+<file path=ppt/slides/slide66.xml><?xml version="1.0" encoding="utf-8"?>
 <p:sld xmlns:a="http://schemas.openxmlformats.org/drawingml/2006/main" xmlns:r="http://schemas.openxmlformats.org/officeDocument/2006/relationships" xmlns:p="http://schemas.openxmlformats.org/presentationml/2006/main">
   <p:cSld>
     <p:spTree>
@@ -48716,7 +49106,7 @@
 </p:sld>
 </file>
 
-<file path=ppt/slides/slide65.xml><?xml version="1.0" encoding="utf-8"?>
+<file path=ppt/slides/slide67.xml><?xml version="1.0" encoding="utf-8"?>
 <p:sld xmlns:a="http://schemas.openxmlformats.org/drawingml/2006/main" xmlns:r="http://schemas.openxmlformats.org/officeDocument/2006/relationships" xmlns:p="http://schemas.openxmlformats.org/presentationml/2006/main">
   <p:cSld>
     <p:spTree>
@@ -48939,7 +49329,7 @@
 </p:sld>
 </file>
 
-<file path=ppt/slides/slide66.xml><?xml version="1.0" encoding="utf-8"?>
+<file path=ppt/slides/slide68.xml><?xml version="1.0" encoding="utf-8"?>
 <p:sld xmlns:a="http://schemas.openxmlformats.org/drawingml/2006/main" xmlns:r="http://schemas.openxmlformats.org/officeDocument/2006/relationships" xmlns:p="http://schemas.openxmlformats.org/presentationml/2006/main">
   <p:cSld>
     <p:spTree>
@@ -49052,7 +49442,7 @@
 </p:sld>
 </file>
 
-<file path=ppt/slides/slide67.xml><?xml version="1.0" encoding="utf-8"?>
+<file path=ppt/slides/slide69.xml><?xml version="1.0" encoding="utf-8"?>
 <p:sld xmlns:a="http://schemas.openxmlformats.org/drawingml/2006/main" xmlns:r="http://schemas.openxmlformats.org/officeDocument/2006/relationships" xmlns:p="http://schemas.openxmlformats.org/presentationml/2006/main">
   <p:cSld>
     <p:spTree>
@@ -49141,7 +49531,213 @@
 </p:sld>
 </file>
 
-<file path=ppt/slides/slide68.xml><?xml version="1.0" encoding="utf-8"?>
+<file path=ppt/slides/slide7.xml><?xml version="1.0" encoding="utf-8"?>
+<p:sld xmlns:a="http://schemas.openxmlformats.org/drawingml/2006/main" xmlns:r="http://schemas.openxmlformats.org/officeDocument/2006/relationships" xmlns:p="http://schemas.openxmlformats.org/presentationml/2006/main">
+  <p:cSld>
+    <p:spTree>
+      <p:nvGrpSpPr>
+        <p:cNvPr id="104" name="Shape 104"/>
+        <p:cNvGrpSpPr/>
+        <p:nvPr/>
+      </p:nvGrpSpPr>
+      <p:grpSpPr>
+        <a:xfrm>
+          <a:off x="0" y="0"/>
+          <a:ext cx="0" cy="0"/>
+          <a:chOff x="0" y="0"/>
+          <a:chExt cx="0" cy="0"/>
+        </a:xfrm>
+      </p:grpSpPr>
+      <p:sp>
+        <p:nvSpPr>
+          <p:cNvPr id="105" name="Google Shape;105;p21"/>
+          <p:cNvSpPr txBox="1"/>
+          <p:nvPr>
+            <p:ph type="title"/>
+          </p:nvPr>
+        </p:nvSpPr>
+        <p:spPr>
+          <a:xfrm>
+            <a:off x="311700" y="445025"/>
+            <a:ext cx="8520600" cy="572700"/>
+          </a:xfrm>
+          <a:prstGeom prst="rect">
+            <a:avLst/>
+          </a:prstGeom>
+        </p:spPr>
+        <p:txBody>
+          <a:bodyPr spcFirstLastPara="1" wrap="square" lIns="91425" tIns="91425" rIns="91425" bIns="91425" anchor="t" anchorCtr="0">
+            <a:normAutofit fontScale="90000"/>
+          </a:bodyPr>
+          <a:lstStyle/>
+          <a:p>
+            <a:pPr marL="0" lvl="0" indent="0" algn="l" rtl="0">
+              <a:spcBef>
+                <a:spcPts val="0"/>
+              </a:spcBef>
+              <a:spcAft>
+                <a:spcPts val="0"/>
+              </a:spcAft>
+              <a:buNone/>
+            </a:pPr>
+            <a:r>
+              <a:rPr lang="en-GB"/>
+              <a:t>NLP fields </a:t>
+            </a:r>
+            <a:endParaRPr lang="en-GB"/>
+          </a:p>
+        </p:txBody>
+      </p:sp>
+      <p:sp>
+        <p:nvSpPr>
+          <p:cNvPr id="106" name="Google Shape;106;p21"/>
+          <p:cNvSpPr txBox="1"/>
+          <p:nvPr>
+            <p:ph type="body" idx="1"/>
+          </p:nvPr>
+        </p:nvSpPr>
+        <p:spPr>
+          <a:xfrm>
+            <a:off x="311700" y="1152475"/>
+            <a:ext cx="8520600" cy="3416400"/>
+          </a:xfrm>
+          <a:prstGeom prst="rect">
+            <a:avLst/>
+          </a:prstGeom>
+        </p:spPr>
+        <p:txBody>
+          <a:bodyPr spcFirstLastPara="1" wrap="square" lIns="91425" tIns="91425" rIns="91425" bIns="91425" anchor="t" anchorCtr="0">
+            <a:normAutofit/>
+          </a:bodyPr>
+          <a:lstStyle/>
+          <a:p>
+            <a:pPr marL="0" lvl="0" indent="0" algn="l" rtl="0">
+              <a:spcBef>
+                <a:spcPts val="0"/>
+              </a:spcBef>
+              <a:spcAft>
+                <a:spcPts val="1200"/>
+              </a:spcAft>
+              <a:buNone/>
+            </a:pPr>
+            <a:r>
+              <a:rPr lang="en-GB" sz="2050">
+                <a:solidFill>
+                  <a:srgbClr val="222222"/>
+                </a:solidFill>
+                <a:highlight>
+                  <a:srgbClr val="FFFFFF"/>
+                </a:highlight>
+                <a:latin typeface="Roboto" panose="02000000000000000000"/>
+                <a:ea typeface="Roboto" panose="02000000000000000000"/>
+                <a:cs typeface="Roboto" panose="02000000000000000000"/>
+                <a:sym typeface="Roboto" panose="02000000000000000000"/>
+              </a:rPr>
+              <a:t>NLP combines </a:t>
+            </a:r>
+            <a:r>
+              <a:rPr lang="en-GB" sz="2050" b="1">
+                <a:solidFill>
+                  <a:srgbClr val="222222"/>
+                </a:solidFill>
+                <a:highlight>
+                  <a:srgbClr val="FFFFFF"/>
+                </a:highlight>
+                <a:latin typeface="Roboto" panose="02000000000000000000"/>
+                <a:ea typeface="Roboto" panose="02000000000000000000"/>
+                <a:cs typeface="Roboto" panose="02000000000000000000"/>
+                <a:sym typeface="Roboto" panose="02000000000000000000"/>
+              </a:rPr>
+              <a:t>computational linguistics</a:t>
+            </a:r>
+            <a:r>
+              <a:rPr lang="en-GB" sz="2050">
+                <a:solidFill>
+                  <a:srgbClr val="222222"/>
+                </a:solidFill>
+                <a:highlight>
+                  <a:srgbClr val="FFFFFF"/>
+                </a:highlight>
+                <a:latin typeface="Roboto" panose="02000000000000000000"/>
+                <a:ea typeface="Roboto" panose="02000000000000000000"/>
+                <a:cs typeface="Roboto" panose="02000000000000000000"/>
+                <a:sym typeface="Roboto" panose="02000000000000000000"/>
+              </a:rPr>
+              <a:t>, </a:t>
+            </a:r>
+            <a:r>
+              <a:rPr lang="en-GB" sz="2050" b="1">
+                <a:solidFill>
+                  <a:srgbClr val="222222"/>
+                </a:solidFill>
+                <a:highlight>
+                  <a:srgbClr val="FFFFFF"/>
+                </a:highlight>
+                <a:latin typeface="Roboto" panose="02000000000000000000"/>
+                <a:ea typeface="Roboto" panose="02000000000000000000"/>
+                <a:cs typeface="Roboto" panose="02000000000000000000"/>
+                <a:sym typeface="Roboto" panose="02000000000000000000"/>
+              </a:rPr>
+              <a:t>computer science</a:t>
+            </a:r>
+            <a:r>
+              <a:rPr lang="en-GB" sz="2050">
+                <a:solidFill>
+                  <a:srgbClr val="222222"/>
+                </a:solidFill>
+                <a:highlight>
+                  <a:srgbClr val="FFFFFF"/>
+                </a:highlight>
+                <a:latin typeface="Roboto" panose="02000000000000000000"/>
+                <a:ea typeface="Roboto" panose="02000000000000000000"/>
+                <a:cs typeface="Roboto" panose="02000000000000000000"/>
+                <a:sym typeface="Roboto" panose="02000000000000000000"/>
+              </a:rPr>
+              <a:t>, and </a:t>
+            </a:r>
+            <a:r>
+              <a:rPr lang="en-GB" sz="2050" b="1">
+                <a:solidFill>
+                  <a:srgbClr val="222222"/>
+                </a:solidFill>
+                <a:highlight>
+                  <a:srgbClr val="FFFFFF"/>
+                </a:highlight>
+                <a:latin typeface="Roboto" panose="02000000000000000000"/>
+                <a:ea typeface="Roboto" panose="02000000000000000000"/>
+                <a:cs typeface="Roboto" panose="02000000000000000000"/>
+                <a:sym typeface="Roboto" panose="02000000000000000000"/>
+              </a:rPr>
+              <a:t>machine learning</a:t>
+            </a:r>
+            <a:r>
+              <a:rPr lang="en-GB" sz="2050">
+                <a:solidFill>
+                  <a:srgbClr val="222222"/>
+                </a:solidFill>
+                <a:highlight>
+                  <a:srgbClr val="FFFFFF"/>
+                </a:highlight>
+                <a:latin typeface="Roboto" panose="02000000000000000000"/>
+                <a:ea typeface="Roboto" panose="02000000000000000000"/>
+                <a:cs typeface="Roboto" panose="02000000000000000000"/>
+                <a:sym typeface="Roboto" panose="02000000000000000000"/>
+              </a:rPr>
+              <a:t> to process and analyze large amounts of natural language data.</a:t>
+            </a:r>
+            <a:endParaRPr sz="2600"/>
+          </a:p>
+        </p:txBody>
+      </p:sp>
+    </p:spTree>
+  </p:cSld>
+  <p:clrMapOvr>
+    <a:masterClrMapping/>
+  </p:clrMapOvr>
+</p:sld>
+</file>
+
+<file path=ppt/slides/slide70.xml><?xml version="1.0" encoding="utf-8"?>
 <p:sld xmlns:a="http://schemas.openxmlformats.org/drawingml/2006/main" xmlns:r="http://schemas.openxmlformats.org/officeDocument/2006/relationships" xmlns:p="http://schemas.openxmlformats.org/presentationml/2006/main">
   <p:cSld>
     <p:bg>
@@ -49407,7 +50003,7 @@
 </p:sld>
 </file>
 
-<file path=ppt/slides/slide69.xml><?xml version="1.0" encoding="utf-8"?>
+<file path=ppt/slides/slide71.xml><?xml version="1.0" encoding="utf-8"?>
 <p:sld xmlns:a="http://schemas.openxmlformats.org/drawingml/2006/main" xmlns:r="http://schemas.openxmlformats.org/officeDocument/2006/relationships" xmlns:p="http://schemas.openxmlformats.org/presentationml/2006/main">
   <p:cSld>
     <p:spTree>
@@ -49591,212 +50187,6 @@
               <a:cs typeface="Palatino"/>
               <a:sym typeface="Palatino"/>
             </a:endParaRPr>
-          </a:p>
-        </p:txBody>
-      </p:sp>
-    </p:spTree>
-  </p:cSld>
-  <p:clrMapOvr>
-    <a:masterClrMapping/>
-  </p:clrMapOvr>
-</p:sld>
-</file>
-
-<file path=ppt/slides/slide7.xml><?xml version="1.0" encoding="utf-8"?>
-<p:sld xmlns:a="http://schemas.openxmlformats.org/drawingml/2006/main" xmlns:r="http://schemas.openxmlformats.org/officeDocument/2006/relationships" xmlns:p="http://schemas.openxmlformats.org/presentationml/2006/main">
-  <p:cSld>
-    <p:spTree>
-      <p:nvGrpSpPr>
-        <p:cNvPr id="104" name="Shape 104"/>
-        <p:cNvGrpSpPr/>
-        <p:nvPr/>
-      </p:nvGrpSpPr>
-      <p:grpSpPr>
-        <a:xfrm>
-          <a:off x="0" y="0"/>
-          <a:ext cx="0" cy="0"/>
-          <a:chOff x="0" y="0"/>
-          <a:chExt cx="0" cy="0"/>
-        </a:xfrm>
-      </p:grpSpPr>
-      <p:sp>
-        <p:nvSpPr>
-          <p:cNvPr id="105" name="Google Shape;105;p21"/>
-          <p:cNvSpPr txBox="1"/>
-          <p:nvPr>
-            <p:ph type="title"/>
-          </p:nvPr>
-        </p:nvSpPr>
-        <p:spPr>
-          <a:xfrm>
-            <a:off x="311700" y="445025"/>
-            <a:ext cx="8520600" cy="572700"/>
-          </a:xfrm>
-          <a:prstGeom prst="rect">
-            <a:avLst/>
-          </a:prstGeom>
-        </p:spPr>
-        <p:txBody>
-          <a:bodyPr spcFirstLastPara="1" wrap="square" lIns="91425" tIns="91425" rIns="91425" bIns="91425" anchor="t" anchorCtr="0">
-            <a:normAutofit fontScale="90000"/>
-          </a:bodyPr>
-          <a:lstStyle/>
-          <a:p>
-            <a:pPr marL="0" lvl="0" indent="0" algn="l" rtl="0">
-              <a:spcBef>
-                <a:spcPts val="0"/>
-              </a:spcBef>
-              <a:spcAft>
-                <a:spcPts val="0"/>
-              </a:spcAft>
-              <a:buNone/>
-            </a:pPr>
-            <a:r>
-              <a:rPr lang="en-GB"/>
-              <a:t>NLP fields </a:t>
-            </a:r>
-            <a:endParaRPr lang="en-GB"/>
-          </a:p>
-        </p:txBody>
-      </p:sp>
-      <p:sp>
-        <p:nvSpPr>
-          <p:cNvPr id="106" name="Google Shape;106;p21"/>
-          <p:cNvSpPr txBox="1"/>
-          <p:nvPr>
-            <p:ph type="body" idx="1"/>
-          </p:nvPr>
-        </p:nvSpPr>
-        <p:spPr>
-          <a:xfrm>
-            <a:off x="311700" y="1152475"/>
-            <a:ext cx="8520600" cy="3416400"/>
-          </a:xfrm>
-          <a:prstGeom prst="rect">
-            <a:avLst/>
-          </a:prstGeom>
-        </p:spPr>
-        <p:txBody>
-          <a:bodyPr spcFirstLastPara="1" wrap="square" lIns="91425" tIns="91425" rIns="91425" bIns="91425" anchor="t" anchorCtr="0">
-            <a:normAutofit/>
-          </a:bodyPr>
-          <a:lstStyle/>
-          <a:p>
-            <a:pPr marL="0" lvl="0" indent="0" algn="l" rtl="0">
-              <a:spcBef>
-                <a:spcPts val="0"/>
-              </a:spcBef>
-              <a:spcAft>
-                <a:spcPts val="1200"/>
-              </a:spcAft>
-              <a:buNone/>
-            </a:pPr>
-            <a:r>
-              <a:rPr lang="en-GB" sz="2050">
-                <a:solidFill>
-                  <a:srgbClr val="222222"/>
-                </a:solidFill>
-                <a:highlight>
-                  <a:srgbClr val="FFFFFF"/>
-                </a:highlight>
-                <a:latin typeface="Roboto" panose="02000000000000000000"/>
-                <a:ea typeface="Roboto" panose="02000000000000000000"/>
-                <a:cs typeface="Roboto" panose="02000000000000000000"/>
-                <a:sym typeface="Roboto" panose="02000000000000000000"/>
-              </a:rPr>
-              <a:t>NLP combines </a:t>
-            </a:r>
-            <a:r>
-              <a:rPr lang="en-GB" sz="2050" b="1">
-                <a:solidFill>
-                  <a:srgbClr val="222222"/>
-                </a:solidFill>
-                <a:highlight>
-                  <a:srgbClr val="FFFFFF"/>
-                </a:highlight>
-                <a:latin typeface="Roboto" panose="02000000000000000000"/>
-                <a:ea typeface="Roboto" panose="02000000000000000000"/>
-                <a:cs typeface="Roboto" panose="02000000000000000000"/>
-                <a:sym typeface="Roboto" panose="02000000000000000000"/>
-              </a:rPr>
-              <a:t>computational linguistics</a:t>
-            </a:r>
-            <a:r>
-              <a:rPr lang="en-GB" sz="2050">
-                <a:solidFill>
-                  <a:srgbClr val="222222"/>
-                </a:solidFill>
-                <a:highlight>
-                  <a:srgbClr val="FFFFFF"/>
-                </a:highlight>
-                <a:latin typeface="Roboto" panose="02000000000000000000"/>
-                <a:ea typeface="Roboto" panose="02000000000000000000"/>
-                <a:cs typeface="Roboto" panose="02000000000000000000"/>
-                <a:sym typeface="Roboto" panose="02000000000000000000"/>
-              </a:rPr>
-              <a:t>, </a:t>
-            </a:r>
-            <a:r>
-              <a:rPr lang="en-GB" sz="2050" b="1">
-                <a:solidFill>
-                  <a:srgbClr val="222222"/>
-                </a:solidFill>
-                <a:highlight>
-                  <a:srgbClr val="FFFFFF"/>
-                </a:highlight>
-                <a:latin typeface="Roboto" panose="02000000000000000000"/>
-                <a:ea typeface="Roboto" panose="02000000000000000000"/>
-                <a:cs typeface="Roboto" panose="02000000000000000000"/>
-                <a:sym typeface="Roboto" panose="02000000000000000000"/>
-              </a:rPr>
-              <a:t>computer science</a:t>
-            </a:r>
-            <a:r>
-              <a:rPr lang="en-GB" sz="2050">
-                <a:solidFill>
-                  <a:srgbClr val="222222"/>
-                </a:solidFill>
-                <a:highlight>
-                  <a:srgbClr val="FFFFFF"/>
-                </a:highlight>
-                <a:latin typeface="Roboto" panose="02000000000000000000"/>
-                <a:ea typeface="Roboto" panose="02000000000000000000"/>
-                <a:cs typeface="Roboto" panose="02000000000000000000"/>
-                <a:sym typeface="Roboto" panose="02000000000000000000"/>
-              </a:rPr>
-              <a:t>, and </a:t>
-            </a:r>
-            <a:r>
-              <a:rPr lang="en-GB" sz="2050" b="1">
-                <a:solidFill>
-                  <a:srgbClr val="222222"/>
-                </a:solidFill>
-                <a:highlight>
-                  <a:srgbClr val="FFFFFF"/>
-                </a:highlight>
-                <a:latin typeface="Roboto" panose="02000000000000000000"/>
-                <a:ea typeface="Roboto" panose="02000000000000000000"/>
-                <a:cs typeface="Roboto" panose="02000000000000000000"/>
-                <a:sym typeface="Roboto" panose="02000000000000000000"/>
-              </a:rPr>
-              <a:t>machine learning</a:t>
-            </a:r>
-            <a:r>
-              <a:rPr lang="en-GB" sz="2050">
-                <a:solidFill>
-                  <a:srgbClr val="222222"/>
-                </a:solidFill>
-                <a:highlight>
-                  <a:srgbClr val="FFFFFF"/>
-                </a:highlight>
-                <a:latin typeface="Roboto" panose="02000000000000000000"/>
-                <a:ea typeface="Roboto" panose="02000000000000000000"/>
-                <a:cs typeface="Roboto" panose="02000000000000000000"/>
-                <a:sym typeface="Roboto" panose="02000000000000000000"/>
-              </a:rPr>
-              <a:t> to process and analyze large amounts of natural language data.</a:t>
-            </a:r>
-            <a:endParaRPr sz="2600"/>
           </a:p>
         </p:txBody>
       </p:sp>

</xml_diff>